<commit_message>
Add concurrent programming slides to presentation
</commit_message>
<xml_diff>
--- a/presentation.pptx
+++ b/presentation.pptx
@@ -5,10 +5,10 @@
     <p:sldMasterId id="2147483713" r:id="rId1"/>
   </p:sldMasterIdLst>
   <p:notesMasterIdLst>
-    <p:notesMasterId r:id="rId15"/>
+    <p:notesMasterId r:id="rId17"/>
   </p:notesMasterIdLst>
   <p:handoutMasterIdLst>
-    <p:handoutMasterId r:id="rId16"/>
+    <p:handoutMasterId r:id="rId18"/>
   </p:handoutMasterIdLst>
   <p:sldIdLst>
     <p:sldId id="256" r:id="rId2"/>
@@ -23,17 +23,19 @@
     <p:sldId id="260" r:id="rId11"/>
     <p:sldId id="263" r:id="rId12"/>
     <p:sldId id="262" r:id="rId13"/>
-    <p:sldId id="264" r:id="rId14"/>
+    <p:sldId id="269" r:id="rId14"/>
+    <p:sldId id="270" r:id="rId15"/>
+    <p:sldId id="264" r:id="rId16"/>
   </p:sldIdLst>
   <p:sldSz cx="10693400" cy="7561263"/>
   <p:notesSz cx="6858000" cy="9144000"/>
   <p:embeddedFontLst>
     <p:embeddedFont>
       <p:font typeface="Consolas" panose="020B0609020204030204" pitchFamily="49" charset="0"/>
-      <p:regular r:id="rId17"/>
-      <p:bold r:id="rId18"/>
-      <p:italic r:id="rId19"/>
-      <p:boldItalic r:id="rId20"/>
+      <p:regular r:id="rId19"/>
+      <p:bold r:id="rId20"/>
+      <p:italic r:id="rId21"/>
+      <p:boldItalic r:id="rId22"/>
     </p:embeddedFont>
   </p:embeddedFontLst>
   <p:defaultTextStyle>
@@ -1131,19 +1133,11 @@
             </a:pPr>
             <a:r>
               <a:rPr lang="de-CH" dirty="0" smtClean="0"/>
-              <a:t>Sehr </a:t>
-            </a:r>
-            <a:r>
-              <a:rPr lang="de-CH" dirty="0" smtClean="0"/>
-              <a:t>mühsam bei grosser</a:t>
+              <a:t>Sehr mühsam bei grosser</a:t>
             </a:r>
             <a:r>
               <a:rPr lang="de-CH" baseline="0" dirty="0" smtClean="0"/>
-              <a:t> Code-Base und mehreren </a:t>
-            </a:r>
-            <a:r>
-              <a:rPr lang="de-CH" baseline="0" dirty="0" smtClean="0"/>
-              <a:t>Entwicklern</a:t>
+              <a:t> Code-Base und mehreren Entwicklern</a:t>
             </a:r>
           </a:p>
           <a:p>
@@ -1195,6 +1189,113 @@
     <p:extLst>
       <p:ext uri="{BB962C8B-B14F-4D97-AF65-F5344CB8AC3E}">
         <p14:creationId xmlns:p14="http://schemas.microsoft.com/office/powerpoint/2010/main" val="2175607041"/>
+      </p:ext>
+    </p:extLst>
+  </p:cSld>
+  <p:clrMapOvr>
+    <a:masterClrMapping/>
+  </p:clrMapOvr>
+</p:notes>
+</file>
+
+<file path=ppt/notesSlides/notesSlide10.xml><?xml version="1.0" encoding="utf-8"?>
+<p:notes xmlns:a="http://schemas.openxmlformats.org/drawingml/2006/main" xmlns:r="http://schemas.openxmlformats.org/officeDocument/2006/relationships" xmlns:p="http://schemas.openxmlformats.org/presentationml/2006/main">
+  <p:cSld>
+    <p:spTree>
+      <p:nvGrpSpPr>
+        <p:cNvPr id="1" name=""/>
+        <p:cNvGrpSpPr/>
+        <p:nvPr/>
+      </p:nvGrpSpPr>
+      <p:grpSpPr>
+        <a:xfrm>
+          <a:off x="0" y="0"/>
+          <a:ext cx="0" cy="0"/>
+          <a:chOff x="0" y="0"/>
+          <a:chExt cx="0" cy="0"/>
+        </a:xfrm>
+      </p:grpSpPr>
+      <p:sp>
+        <p:nvSpPr>
+          <p:cNvPr id="2" name="Folienbildplatzhalter 1"/>
+          <p:cNvSpPr>
+            <a:spLocks noGrp="1" noRot="1" noChangeAspect="1"/>
+          </p:cNvSpPr>
+          <p:nvPr>
+            <p:ph type="sldImg"/>
+          </p:nvPr>
+        </p:nvSpPr>
+        <p:spPr/>
+      </p:sp>
+      <p:sp>
+        <p:nvSpPr>
+          <p:cNvPr id="3" name="Notizenplatzhalter 2"/>
+          <p:cNvSpPr>
+            <a:spLocks noGrp="1"/>
+          </p:cNvSpPr>
+          <p:nvPr>
+            <p:ph type="body" idx="1"/>
+          </p:nvPr>
+        </p:nvSpPr>
+        <p:spPr/>
+        <p:txBody>
+          <a:bodyPr/>
+          <a:lstStyle/>
+          <a:p>
+            <a:pPr marL="171450" indent="-171450">
+              <a:buFontTx/>
+              <a:buChar char="-"/>
+            </a:pPr>
+            <a:r>
+              <a:rPr lang="de-CH" dirty="0" smtClean="0"/>
+              <a:t>Wollt Ihr</a:t>
+            </a:r>
+            <a:r>
+              <a:rPr lang="de-CH" baseline="0" dirty="0" smtClean="0"/>
+              <a:t> noch i18n sehen?</a:t>
+            </a:r>
+          </a:p>
+          <a:p>
+            <a:pPr marL="171450" indent="-171450">
+              <a:buFontTx/>
+              <a:buChar char="-"/>
+            </a:pPr>
+            <a:r>
+              <a:rPr lang="de-CH" baseline="0" dirty="0" smtClean="0"/>
+              <a:t>Wollt Ihr Code sehen?</a:t>
+            </a:r>
+            <a:endParaRPr lang="de-CH" dirty="0"/>
+          </a:p>
+        </p:txBody>
+      </p:sp>
+      <p:sp>
+        <p:nvSpPr>
+          <p:cNvPr id="4" name="Foliennummernplatzhalter 3"/>
+          <p:cNvSpPr>
+            <a:spLocks noGrp="1"/>
+          </p:cNvSpPr>
+          <p:nvPr>
+            <p:ph type="sldNum" sz="quarter" idx="10"/>
+          </p:nvPr>
+        </p:nvSpPr>
+        <p:spPr/>
+        <p:txBody>
+          <a:bodyPr/>
+          <a:lstStyle/>
+          <a:p>
+            <a:fld id="{058061DB-DF71-4765-99A4-14E22DF63CCF}" type="slidenum">
+              <a:rPr lang="de-CH" smtClean="0"/>
+              <a:pPr/>
+              <a:t>15</a:t>
+            </a:fld>
+            <a:endParaRPr lang="de-CH"/>
+          </a:p>
+        </p:txBody>
+      </p:sp>
+    </p:spTree>
+    <p:extLst>
+      <p:ext uri="{BB962C8B-B14F-4D97-AF65-F5344CB8AC3E}">
+        <p14:creationId xmlns:p14="http://schemas.microsoft.com/office/powerpoint/2010/main" val="4183228217"/>
       </p:ext>
     </p:extLst>
   </p:cSld>
@@ -1457,15 +1558,7 @@
             </a:pPr>
             <a:r>
               <a:rPr lang="de-CH" baseline="0" dirty="0" smtClean="0"/>
-              <a:t>Anders </a:t>
-            </a:r>
-            <a:r>
-              <a:rPr lang="de-CH" baseline="0" dirty="0" smtClean="0"/>
-              <a:t>als in Vorlesung habe ich View nicht mit Java </a:t>
-            </a:r>
-            <a:r>
-              <a:rPr lang="de-CH" baseline="0" dirty="0" smtClean="0"/>
-              <a:t>programmiert</a:t>
+              <a:t>Anders als in Vorlesung habe ich View nicht mit Java programmiert</a:t>
             </a:r>
           </a:p>
           <a:p>
@@ -1729,29 +1822,19 @@
           <a:bodyPr/>
           <a:lstStyle/>
           <a:p>
-            <a:pPr marL="171450" indent="-171450">
-              <a:buFontTx/>
-              <a:buChar char="-"/>
-            </a:pPr>
+            <a:r>
+              <a:rPr lang="de-CH" dirty="0" smtClean="0"/>
+              <a:t>- </a:t>
+            </a:r>
+            <a:r>
+              <a:rPr lang="de-CH" dirty="0" err="1" smtClean="0"/>
+              <a:t>Convention</a:t>
+            </a:r>
             <a:r>
               <a:rPr lang="de-CH" baseline="0" dirty="0" smtClean="0"/>
-              <a:t>Damit ich auch eigene Instance injizieren kann</a:t>
-            </a:r>
-          </a:p>
-          <a:p>
-            <a:pPr marL="628650" lvl="1" indent="-171450">
-              <a:buFontTx/>
-              <a:buChar char="-"/>
-            </a:pPr>
-            <a:r>
-              <a:rPr lang="de-CH" baseline="0" dirty="0" smtClean="0"/>
-              <a:t>Z.B. </a:t>
-            </a:r>
-            <a:r>
-              <a:rPr lang="de-CH" baseline="0" dirty="0" err="1" smtClean="0"/>
-              <a:t>stage</a:t>
-            </a:r>
-            <a:endParaRPr lang="de-CH" baseline="0" dirty="0" smtClean="0"/>
+              <a:t> zeigen!</a:t>
+            </a:r>
+            <a:endParaRPr lang="de-CH" dirty="0"/>
           </a:p>
         </p:txBody>
       </p:sp>
@@ -1773,7 +1856,7 @@
             <a:fld id="{058061DB-DF71-4765-99A4-14E22DF63CCF}" type="slidenum">
               <a:rPr lang="de-CH" smtClean="0"/>
               <a:pPr/>
-              <a:t>9</a:t>
+              <a:t>7</a:t>
             </a:fld>
             <a:endParaRPr lang="de-CH"/>
           </a:p>
@@ -1782,7 +1865,7 @@
     </p:spTree>
     <p:extLst>
       <p:ext uri="{BB962C8B-B14F-4D97-AF65-F5344CB8AC3E}">
-        <p14:creationId xmlns:p14="http://schemas.microsoft.com/office/powerpoint/2010/main" val="3133906547"/>
+        <p14:creationId xmlns:p14="http://schemas.microsoft.com/office/powerpoint/2010/main" val="3700188619"/>
       </p:ext>
     </p:extLst>
   </p:cSld>
@@ -1836,88 +1919,29 @@
           <a:bodyPr/>
           <a:lstStyle/>
           <a:p>
-            <a:r>
-              <a:rPr lang="de-CH" dirty="0" smtClean="0"/>
-              <a:t>- </a:t>
-            </a:r>
-            <a:r>
-              <a:rPr lang="de-CH" dirty="0" err="1" smtClean="0"/>
-              <a:t>Build</a:t>
-            </a:r>
-            <a:r>
-              <a:rPr lang="de-CH" dirty="0" smtClean="0"/>
-              <a:t>-Tool</a:t>
-            </a:r>
-          </a:p>
-          <a:p>
-            <a:r>
-              <a:rPr lang="de-CH" dirty="0" smtClean="0"/>
-              <a:t>-</a:t>
-            </a:r>
+            <a:pPr marL="171450" indent="-171450">
+              <a:buFontTx/>
+              <a:buChar char="-"/>
+            </a:pPr>
             <a:r>
               <a:rPr lang="de-CH" baseline="0" dirty="0" smtClean="0"/>
-              <a:t> Läuft auf allen IDEs und man muss nicht IDE-</a:t>
+              <a:t>Damit ich auch eigene Instance injizieren kann</a:t>
+            </a:r>
+          </a:p>
+          <a:p>
+            <a:pPr marL="628650" lvl="1" indent="-171450">
+              <a:buFontTx/>
+              <a:buChar char="-"/>
+            </a:pPr>
+            <a:r>
+              <a:rPr lang="de-CH" baseline="0" dirty="0" smtClean="0"/>
+              <a:t>Z.B. </a:t>
             </a:r>
             <a:r>
               <a:rPr lang="de-CH" baseline="0" dirty="0" err="1" smtClean="0"/>
-              <a:t>Config</a:t>
-            </a:r>
-            <a:r>
-              <a:rPr lang="de-CH" baseline="0" dirty="0" smtClean="0"/>
-              <a:t>-Files ins </a:t>
-            </a:r>
-            <a:r>
-              <a:rPr lang="de-CH" baseline="0" dirty="0" err="1" smtClean="0"/>
-              <a:t>Repo</a:t>
-            </a:r>
-            <a:r>
-              <a:rPr lang="de-CH" baseline="0" dirty="0" smtClean="0"/>
-              <a:t> </a:t>
-            </a:r>
-            <a:r>
-              <a:rPr lang="de-CH" baseline="0" dirty="0" err="1" smtClean="0"/>
-              <a:t>commiten</a:t>
+              <a:t>stage</a:t>
             </a:r>
             <a:endParaRPr lang="de-CH" baseline="0" dirty="0" smtClean="0"/>
-          </a:p>
-          <a:p>
-            <a:r>
-              <a:rPr lang="de-CH" baseline="0" dirty="0" smtClean="0"/>
-              <a:t>- </a:t>
-            </a:r>
-            <a:r>
-              <a:rPr lang="de-CH" dirty="0" smtClean="0"/>
-              <a:t>Über</a:t>
-            </a:r>
-            <a:r>
-              <a:rPr lang="de-CH" baseline="0" dirty="0" smtClean="0"/>
-              <a:t> Konvention vorgegeben wo </a:t>
-            </a:r>
-            <a:r>
-              <a:rPr lang="de-CH" baseline="0" dirty="0" err="1" smtClean="0"/>
-              <a:t>source</a:t>
-            </a:r>
-            <a:r>
-              <a:rPr lang="de-CH" baseline="0" dirty="0" smtClean="0"/>
-              <a:t>, </a:t>
-            </a:r>
-            <a:r>
-              <a:rPr lang="de-CH" baseline="0" dirty="0" err="1" smtClean="0"/>
-              <a:t>test</a:t>
-            </a:r>
-            <a:r>
-              <a:rPr lang="de-CH" baseline="0" dirty="0" smtClean="0"/>
-              <a:t> und </a:t>
-            </a:r>
-            <a:r>
-              <a:rPr lang="de-CH" baseline="0" dirty="0" err="1" smtClean="0"/>
-              <a:t>resources</a:t>
-            </a:r>
-            <a:r>
-              <a:rPr lang="de-CH" baseline="0" dirty="0" smtClean="0"/>
-              <a:t> Ordner ist</a:t>
-            </a:r>
-            <a:endParaRPr lang="de-CH" dirty="0"/>
           </a:p>
         </p:txBody>
       </p:sp>
@@ -1939,7 +1963,7 @@
             <a:fld id="{058061DB-DF71-4765-99A4-14E22DF63CCF}" type="slidenum">
               <a:rPr lang="de-CH" smtClean="0"/>
               <a:pPr/>
-              <a:t>10</a:t>
+              <a:t>9</a:t>
             </a:fld>
             <a:endParaRPr lang="de-CH"/>
           </a:p>
@@ -1948,7 +1972,7 @@
     </p:spTree>
     <p:extLst>
       <p:ext uri="{BB962C8B-B14F-4D97-AF65-F5344CB8AC3E}">
-        <p14:creationId xmlns:p14="http://schemas.microsoft.com/office/powerpoint/2010/main" val="2479164671"/>
+        <p14:creationId xmlns:p14="http://schemas.microsoft.com/office/powerpoint/2010/main" val="3133906547"/>
       </p:ext>
     </p:extLst>
   </p:cSld>
@@ -2004,6 +2028,172 @@
           <a:p>
             <a:r>
               <a:rPr lang="de-CH" dirty="0" smtClean="0"/>
+              <a:t>- </a:t>
+            </a:r>
+            <a:r>
+              <a:rPr lang="de-CH" dirty="0" err="1" smtClean="0"/>
+              <a:t>Build</a:t>
+            </a:r>
+            <a:r>
+              <a:rPr lang="de-CH" dirty="0" smtClean="0"/>
+              <a:t>-Tool</a:t>
+            </a:r>
+          </a:p>
+          <a:p>
+            <a:r>
+              <a:rPr lang="de-CH" dirty="0" smtClean="0"/>
+              <a:t>-</a:t>
+            </a:r>
+            <a:r>
+              <a:rPr lang="de-CH" baseline="0" dirty="0" smtClean="0"/>
+              <a:t> Läuft auf allen IDEs und man muss nicht IDE-</a:t>
+            </a:r>
+            <a:r>
+              <a:rPr lang="de-CH" baseline="0" dirty="0" err="1" smtClean="0"/>
+              <a:t>Config</a:t>
+            </a:r>
+            <a:r>
+              <a:rPr lang="de-CH" baseline="0" dirty="0" smtClean="0"/>
+              <a:t>-Files ins </a:t>
+            </a:r>
+            <a:r>
+              <a:rPr lang="de-CH" baseline="0" dirty="0" err="1" smtClean="0"/>
+              <a:t>Repo</a:t>
+            </a:r>
+            <a:r>
+              <a:rPr lang="de-CH" baseline="0" dirty="0" smtClean="0"/>
+              <a:t> </a:t>
+            </a:r>
+            <a:r>
+              <a:rPr lang="de-CH" baseline="0" dirty="0" err="1" smtClean="0"/>
+              <a:t>commiten</a:t>
+            </a:r>
+            <a:endParaRPr lang="de-CH" baseline="0" dirty="0" smtClean="0"/>
+          </a:p>
+          <a:p>
+            <a:r>
+              <a:rPr lang="de-CH" baseline="0" dirty="0" smtClean="0"/>
+              <a:t>- </a:t>
+            </a:r>
+            <a:r>
+              <a:rPr lang="de-CH" dirty="0" smtClean="0"/>
+              <a:t>Über</a:t>
+            </a:r>
+            <a:r>
+              <a:rPr lang="de-CH" baseline="0" dirty="0" smtClean="0"/>
+              <a:t> Konvention vorgegeben wo </a:t>
+            </a:r>
+            <a:r>
+              <a:rPr lang="de-CH" baseline="0" dirty="0" err="1" smtClean="0"/>
+              <a:t>source</a:t>
+            </a:r>
+            <a:r>
+              <a:rPr lang="de-CH" baseline="0" dirty="0" smtClean="0"/>
+              <a:t>, </a:t>
+            </a:r>
+            <a:r>
+              <a:rPr lang="de-CH" baseline="0" dirty="0" err="1" smtClean="0"/>
+              <a:t>test</a:t>
+            </a:r>
+            <a:r>
+              <a:rPr lang="de-CH" baseline="0" dirty="0" smtClean="0"/>
+              <a:t> und </a:t>
+            </a:r>
+            <a:r>
+              <a:rPr lang="de-CH" baseline="0" dirty="0" err="1" smtClean="0"/>
+              <a:t>resources</a:t>
+            </a:r>
+            <a:r>
+              <a:rPr lang="de-CH" baseline="0" dirty="0" smtClean="0"/>
+              <a:t> Ordner ist</a:t>
+            </a:r>
+            <a:endParaRPr lang="de-CH" dirty="0"/>
+          </a:p>
+        </p:txBody>
+      </p:sp>
+      <p:sp>
+        <p:nvSpPr>
+          <p:cNvPr id="4" name="Foliennummernplatzhalter 3"/>
+          <p:cNvSpPr>
+            <a:spLocks noGrp="1"/>
+          </p:cNvSpPr>
+          <p:nvPr>
+            <p:ph type="sldNum" sz="quarter" idx="10"/>
+          </p:nvPr>
+        </p:nvSpPr>
+        <p:spPr/>
+        <p:txBody>
+          <a:bodyPr/>
+          <a:lstStyle/>
+          <a:p>
+            <a:fld id="{058061DB-DF71-4765-99A4-14E22DF63CCF}" type="slidenum">
+              <a:rPr lang="de-CH" smtClean="0"/>
+              <a:pPr/>
+              <a:t>10</a:t>
+            </a:fld>
+            <a:endParaRPr lang="de-CH"/>
+          </a:p>
+        </p:txBody>
+      </p:sp>
+    </p:spTree>
+    <p:extLst>
+      <p:ext uri="{BB962C8B-B14F-4D97-AF65-F5344CB8AC3E}">
+        <p14:creationId xmlns:p14="http://schemas.microsoft.com/office/powerpoint/2010/main" val="2479164671"/>
+      </p:ext>
+    </p:extLst>
+  </p:cSld>
+  <p:clrMapOvr>
+    <a:masterClrMapping/>
+  </p:clrMapOvr>
+</p:notes>
+</file>
+
+<file path=ppt/notesSlides/notesSlide8.xml><?xml version="1.0" encoding="utf-8"?>
+<p:notes xmlns:a="http://schemas.openxmlformats.org/drawingml/2006/main" xmlns:r="http://schemas.openxmlformats.org/officeDocument/2006/relationships" xmlns:p="http://schemas.openxmlformats.org/presentationml/2006/main">
+  <p:cSld>
+    <p:spTree>
+      <p:nvGrpSpPr>
+        <p:cNvPr id="1" name=""/>
+        <p:cNvGrpSpPr/>
+        <p:nvPr/>
+      </p:nvGrpSpPr>
+      <p:grpSpPr>
+        <a:xfrm>
+          <a:off x="0" y="0"/>
+          <a:ext cx="0" cy="0"/>
+          <a:chOff x="0" y="0"/>
+          <a:chExt cx="0" cy="0"/>
+        </a:xfrm>
+      </p:grpSpPr>
+      <p:sp>
+        <p:nvSpPr>
+          <p:cNvPr id="2" name="Folienbildplatzhalter 1"/>
+          <p:cNvSpPr>
+            <a:spLocks noGrp="1" noRot="1" noChangeAspect="1"/>
+          </p:cNvSpPr>
+          <p:nvPr>
+            <p:ph type="sldImg"/>
+          </p:nvPr>
+        </p:nvSpPr>
+        <p:spPr/>
+      </p:sp>
+      <p:sp>
+        <p:nvSpPr>
+          <p:cNvPr id="3" name="Notizenplatzhalter 2"/>
+          <p:cNvSpPr>
+            <a:spLocks noGrp="1"/>
+          </p:cNvSpPr>
+          <p:nvPr>
+            <p:ph type="body" idx="1"/>
+          </p:nvPr>
+        </p:nvSpPr>
+        <p:spPr/>
+        <p:txBody>
+          <a:bodyPr/>
+          <a:lstStyle/>
+          <a:p>
+            <a:r>
+              <a:rPr lang="de-CH" dirty="0" smtClean="0"/>
               <a:t>- Tasks wie </a:t>
             </a:r>
             <a:r>
@@ -2067,7 +2257,7 @@
 </p:notes>
 </file>
 
-<file path=ppt/notesSlides/notesSlide8.xml><?xml version="1.0" encoding="utf-8"?>
+<file path=ppt/notesSlides/notesSlide9.xml><?xml version="1.0" encoding="utf-8"?>
 <p:notes xmlns:a="http://schemas.openxmlformats.org/drawingml/2006/main" xmlns:r="http://schemas.openxmlformats.org/officeDocument/2006/relationships" xmlns:p="http://schemas.openxmlformats.org/presentationml/2006/main">
   <p:cSld>
     <p:spTree>
@@ -2531,7 +2721,7 @@
                   <a:srgbClr val="000000"/>
                 </a:solidFill>
               </a:rPr>
-              <a:t>29.05.2016</a:t>
+              <a:t>14.06.2016</a:t>
             </a:fld>
             <a:endParaRPr lang="de-CH">
               <a:solidFill>
@@ -2741,7 +2931,7 @@
                   <a:srgbClr val="000000"/>
                 </a:solidFill>
               </a:rPr>
-              <a:t>29.05.2016</a:t>
+              <a:t>14.06.2016</a:t>
             </a:fld>
             <a:endParaRPr lang="de-CH">
               <a:solidFill>
@@ -2949,7 +3139,7 @@
                   <a:srgbClr val="000000"/>
                 </a:solidFill>
               </a:rPr>
-              <a:t>29.05.2016</a:t>
+              <a:t>14.06.2016</a:t>
             </a:fld>
             <a:endParaRPr lang="de-CH">
               <a:solidFill>
@@ -3157,7 +3347,7 @@
                   <a:srgbClr val="000000"/>
                 </a:solidFill>
               </a:rPr>
-              <a:t>29.05.2016</a:t>
+              <a:t>14.06.2016</a:t>
             </a:fld>
             <a:endParaRPr lang="de-CH">
               <a:solidFill>
@@ -3613,7 +3803,7 @@
                   <a:srgbClr val="000000"/>
                 </a:solidFill>
               </a:rPr>
-              <a:t>29.05.2016</a:t>
+              <a:t>14.06.2016</a:t>
             </a:fld>
             <a:endParaRPr lang="de-CH">
               <a:solidFill>
@@ -4454,7 +4644,7 @@
                   <a:srgbClr val="000000"/>
                 </a:solidFill>
               </a:rPr>
-              <a:t>29.05.2016</a:t>
+              <a:t>14.06.2016</a:t>
             </a:fld>
             <a:endParaRPr lang="de-CH">
               <a:solidFill>
@@ -4704,7 +4894,7 @@
                   <a:srgbClr val="000000"/>
                 </a:solidFill>
               </a:rPr>
-              <a:t>29.05.2016</a:t>
+              <a:t>14.06.2016</a:t>
             </a:fld>
             <a:endParaRPr lang="de-CH">
               <a:solidFill>
@@ -4977,7 +5167,7 @@
                   <a:srgbClr val="000000"/>
                 </a:solidFill>
               </a:rPr>
-              <a:t>29.05.2016</a:t>
+              <a:t>14.06.2016</a:t>
             </a:fld>
             <a:endParaRPr lang="de-CH">
               <a:solidFill>
@@ -5179,8 +5369,8 @@
         </p:nvSpPr>
         <p:spPr bwMode="auto">
           <a:xfrm>
-            <a:off x="4914652" y="1964039"/>
-            <a:ext cx="5184576" cy="3046988"/>
+            <a:off x="4410596" y="1779373"/>
+            <a:ext cx="5688632" cy="3416320"/>
           </a:xfrm>
           <a:prstGeom prst="rect">
             <a:avLst/>
@@ -5228,7 +5418,7 @@
               <a:tabLst/>
             </a:pPr>
             <a:r>
-              <a:rPr kumimoji="0" lang="de-DE" altLang="de-DE" sz="1600" b="0" i="0" u="none" strike="noStrike" cap="none" normalizeH="0" baseline="0" dirty="0" smtClean="0">
+              <a:rPr kumimoji="0" lang="de-DE" altLang="de-DE" sz="1800" b="0" i="0" u="none" strike="noStrike" cap="none" normalizeH="0" baseline="0" dirty="0" smtClean="0">
                 <a:ln>
                   <a:noFill/>
                 </a:ln>
@@ -5242,7 +5432,7 @@
               <a:t>&lt;</a:t>
             </a:r>
             <a:r>
-              <a:rPr kumimoji="0" lang="de-DE" altLang="de-DE" sz="1600" b="1" i="0" u="none" strike="noStrike" cap="none" normalizeH="0" baseline="0" dirty="0" err="1" smtClean="0">
+              <a:rPr kumimoji="0" lang="de-DE" altLang="de-DE" sz="1800" b="1" i="0" u="none" strike="noStrike" cap="none" normalizeH="0" baseline="0" dirty="0" err="1" smtClean="0">
                 <a:ln>
                   <a:noFill/>
                 </a:ln>
@@ -5256,7 +5446,7 @@
               <a:t>dependency</a:t>
             </a:r>
             <a:r>
-              <a:rPr kumimoji="0" lang="de-DE" altLang="de-DE" sz="1600" b="0" i="0" u="none" strike="noStrike" cap="none" normalizeH="0" baseline="0" dirty="0" smtClean="0">
+              <a:rPr kumimoji="0" lang="de-DE" altLang="de-DE" sz="1800" b="0" i="0" u="none" strike="noStrike" cap="none" normalizeH="0" baseline="0" dirty="0" smtClean="0">
                 <a:ln>
                   <a:noFill/>
                 </a:ln>
@@ -5270,7 +5460,7 @@
               <a:t>&gt;</a:t>
             </a:r>
             <a:br>
-              <a:rPr kumimoji="0" lang="de-DE" altLang="de-DE" sz="1600" b="0" i="0" u="none" strike="noStrike" cap="none" normalizeH="0" baseline="0" dirty="0" smtClean="0">
+              <a:rPr kumimoji="0" lang="de-DE" altLang="de-DE" sz="1800" b="0" i="0" u="none" strike="noStrike" cap="none" normalizeH="0" baseline="0" dirty="0" smtClean="0">
                 <a:ln>
                   <a:noFill/>
                 </a:ln>
@@ -5283,7 +5473,7 @@
               </a:rPr>
             </a:br>
             <a:r>
-              <a:rPr kumimoji="0" lang="de-DE" altLang="de-DE" sz="1600" b="0" i="0" u="none" strike="noStrike" cap="none" normalizeH="0" baseline="0" dirty="0" smtClean="0">
+              <a:rPr kumimoji="0" lang="de-DE" altLang="de-DE" sz="1800" b="0" i="0" u="none" strike="noStrike" cap="none" normalizeH="0" baseline="0" dirty="0" smtClean="0">
                 <a:ln>
                   <a:noFill/>
                 </a:ln>
@@ -5297,7 +5487,7 @@
               <a:t>    &lt;</a:t>
             </a:r>
             <a:r>
-              <a:rPr kumimoji="0" lang="de-DE" altLang="de-DE" sz="1600" b="1" i="0" u="none" strike="noStrike" cap="none" normalizeH="0" baseline="0" dirty="0" err="1" smtClean="0">
+              <a:rPr kumimoji="0" lang="de-DE" altLang="de-DE" sz="1800" b="1" i="0" u="none" strike="noStrike" cap="none" normalizeH="0" baseline="0" dirty="0" err="1" smtClean="0">
                 <a:ln>
                   <a:noFill/>
                 </a:ln>
@@ -5311,7 +5501,7 @@
               <a:t>groupId</a:t>
             </a:r>
             <a:r>
-              <a:rPr kumimoji="0" lang="de-DE" altLang="de-DE" sz="1600" b="0" i="0" u="none" strike="noStrike" cap="none" normalizeH="0" baseline="0" dirty="0" smtClean="0">
+              <a:rPr kumimoji="0" lang="de-DE" altLang="de-DE" sz="1800" b="0" i="0" u="none" strike="noStrike" cap="none" normalizeH="0" baseline="0" dirty="0" smtClean="0">
                 <a:ln>
                   <a:noFill/>
                 </a:ln>
@@ -5325,7 +5515,7 @@
               <a:t>&gt;</a:t>
             </a:r>
             <a:r>
-              <a:rPr kumimoji="0" lang="de-DE" altLang="de-DE" sz="1600" b="0" i="0" u="none" strike="noStrike" cap="none" normalizeH="0" baseline="0" dirty="0" err="1" smtClean="0">
+              <a:rPr kumimoji="0" lang="de-DE" altLang="de-DE" sz="1800" b="0" i="0" u="none" strike="noStrike" cap="none" normalizeH="0" baseline="0" dirty="0" err="1" smtClean="0">
                 <a:ln>
                   <a:noFill/>
                 </a:ln>
@@ -5339,7 +5529,7 @@
               <a:t>org.mockito</a:t>
             </a:r>
             <a:r>
-              <a:rPr kumimoji="0" lang="de-DE" altLang="de-DE" sz="1600" b="0" i="0" u="none" strike="noStrike" cap="none" normalizeH="0" baseline="0" dirty="0" smtClean="0">
+              <a:rPr kumimoji="0" lang="de-DE" altLang="de-DE" sz="1800" b="0" i="0" u="none" strike="noStrike" cap="none" normalizeH="0" baseline="0" dirty="0" smtClean="0">
                 <a:ln>
                   <a:noFill/>
                 </a:ln>
@@ -5353,7 +5543,7 @@
               <a:t>&lt;/</a:t>
             </a:r>
             <a:r>
-              <a:rPr kumimoji="0" lang="de-DE" altLang="de-DE" sz="1600" b="1" i="0" u="none" strike="noStrike" cap="none" normalizeH="0" baseline="0" dirty="0" err="1" smtClean="0">
+              <a:rPr kumimoji="0" lang="de-DE" altLang="de-DE" sz="1800" b="1" i="0" u="none" strike="noStrike" cap="none" normalizeH="0" baseline="0" dirty="0" err="1" smtClean="0">
                 <a:ln>
                   <a:noFill/>
                 </a:ln>
@@ -5367,7 +5557,7 @@
               <a:t>groupId</a:t>
             </a:r>
             <a:r>
-              <a:rPr kumimoji="0" lang="de-DE" altLang="de-DE" sz="1600" b="0" i="0" u="none" strike="noStrike" cap="none" normalizeH="0" baseline="0" dirty="0" smtClean="0">
+              <a:rPr kumimoji="0" lang="de-DE" altLang="de-DE" sz="1800" b="0" i="0" u="none" strike="noStrike" cap="none" normalizeH="0" baseline="0" dirty="0" smtClean="0">
                 <a:ln>
                   <a:noFill/>
                 </a:ln>
@@ -5381,7 +5571,7 @@
               <a:t>&gt;</a:t>
             </a:r>
             <a:br>
-              <a:rPr kumimoji="0" lang="de-DE" altLang="de-DE" sz="1600" b="0" i="0" u="none" strike="noStrike" cap="none" normalizeH="0" baseline="0" dirty="0" smtClean="0">
+              <a:rPr kumimoji="0" lang="de-DE" altLang="de-DE" sz="1800" b="0" i="0" u="none" strike="noStrike" cap="none" normalizeH="0" baseline="0" dirty="0" smtClean="0">
                 <a:ln>
                   <a:noFill/>
                 </a:ln>
@@ -5394,7 +5584,7 @@
               </a:rPr>
             </a:br>
             <a:r>
-              <a:rPr kumimoji="0" lang="de-DE" altLang="de-DE" sz="1600" b="0" i="0" u="none" strike="noStrike" cap="none" normalizeH="0" baseline="0" dirty="0" smtClean="0">
+              <a:rPr kumimoji="0" lang="de-DE" altLang="de-DE" sz="1800" b="0" i="0" u="none" strike="noStrike" cap="none" normalizeH="0" baseline="0" dirty="0" smtClean="0">
                 <a:ln>
                   <a:noFill/>
                 </a:ln>
@@ -5408,7 +5598,7 @@
               <a:t>    &lt;</a:t>
             </a:r>
             <a:r>
-              <a:rPr kumimoji="0" lang="de-DE" altLang="de-DE" sz="1600" b="1" i="0" u="none" strike="noStrike" cap="none" normalizeH="0" baseline="0" dirty="0" err="1" smtClean="0">
+              <a:rPr kumimoji="0" lang="de-DE" altLang="de-DE" sz="1800" b="1" i="0" u="none" strike="noStrike" cap="none" normalizeH="0" baseline="0" dirty="0" err="1" smtClean="0">
                 <a:ln>
                   <a:noFill/>
                 </a:ln>
@@ -5422,7 +5612,7 @@
               <a:t>artifactId</a:t>
             </a:r>
             <a:r>
-              <a:rPr kumimoji="0" lang="de-DE" altLang="de-DE" sz="1600" b="0" i="0" u="none" strike="noStrike" cap="none" normalizeH="0" baseline="0" dirty="0" smtClean="0">
+              <a:rPr kumimoji="0" lang="de-DE" altLang="de-DE" sz="1800" b="0" i="0" u="none" strike="noStrike" cap="none" normalizeH="0" baseline="0" dirty="0" smtClean="0">
                 <a:ln>
                   <a:noFill/>
                 </a:ln>
@@ -5436,7 +5626,7 @@
               <a:t>&gt;</a:t>
             </a:r>
             <a:r>
-              <a:rPr kumimoji="0" lang="de-DE" altLang="de-DE" sz="1600" b="0" i="0" u="none" strike="noStrike" cap="none" normalizeH="0" baseline="0" dirty="0" err="1" smtClean="0">
+              <a:rPr kumimoji="0" lang="de-DE" altLang="de-DE" sz="1800" b="0" i="0" u="none" strike="noStrike" cap="none" normalizeH="0" baseline="0" dirty="0" err="1" smtClean="0">
                 <a:ln>
                   <a:noFill/>
                 </a:ln>
@@ -5450,7 +5640,7 @@
               <a:t>mockito</a:t>
             </a:r>
             <a:r>
-              <a:rPr kumimoji="0" lang="de-DE" altLang="de-DE" sz="1600" b="0" i="0" u="none" strike="noStrike" cap="none" normalizeH="0" baseline="0" dirty="0" smtClean="0">
+              <a:rPr kumimoji="0" lang="de-DE" altLang="de-DE" sz="1800" b="0" i="0" u="none" strike="noStrike" cap="none" normalizeH="0" baseline="0" dirty="0" smtClean="0">
                 <a:ln>
                   <a:noFill/>
                 </a:ln>
@@ -5464,7 +5654,7 @@
               <a:t>-all&lt;/</a:t>
             </a:r>
             <a:r>
-              <a:rPr kumimoji="0" lang="de-DE" altLang="de-DE" sz="1600" b="1" i="0" u="none" strike="noStrike" cap="none" normalizeH="0" baseline="0" dirty="0" err="1" smtClean="0">
+              <a:rPr kumimoji="0" lang="de-DE" altLang="de-DE" sz="1800" b="1" i="0" u="none" strike="noStrike" cap="none" normalizeH="0" baseline="0" dirty="0" err="1" smtClean="0">
                 <a:ln>
                   <a:noFill/>
                 </a:ln>
@@ -5478,7 +5668,7 @@
               <a:t>artifactId</a:t>
             </a:r>
             <a:r>
-              <a:rPr kumimoji="0" lang="de-DE" altLang="de-DE" sz="1600" b="0" i="0" u="none" strike="noStrike" cap="none" normalizeH="0" baseline="0" dirty="0" smtClean="0">
+              <a:rPr kumimoji="0" lang="de-DE" altLang="de-DE" sz="1800" b="0" i="0" u="none" strike="noStrike" cap="none" normalizeH="0" baseline="0" dirty="0" smtClean="0">
                 <a:ln>
                   <a:noFill/>
                 </a:ln>
@@ -5492,7 +5682,7 @@
               <a:t>&gt;</a:t>
             </a:r>
             <a:br>
-              <a:rPr kumimoji="0" lang="de-DE" altLang="de-DE" sz="1600" b="0" i="0" u="none" strike="noStrike" cap="none" normalizeH="0" baseline="0" dirty="0" smtClean="0">
+              <a:rPr kumimoji="0" lang="de-DE" altLang="de-DE" sz="1800" b="0" i="0" u="none" strike="noStrike" cap="none" normalizeH="0" baseline="0" dirty="0" smtClean="0">
                 <a:ln>
                   <a:noFill/>
                 </a:ln>
@@ -5505,7 +5695,7 @@
               </a:rPr>
             </a:br>
             <a:r>
-              <a:rPr kumimoji="0" lang="de-DE" altLang="de-DE" sz="1600" b="0" i="0" u="none" strike="noStrike" cap="none" normalizeH="0" baseline="0" dirty="0" smtClean="0">
+              <a:rPr kumimoji="0" lang="de-DE" altLang="de-DE" sz="1800" b="0" i="0" u="none" strike="noStrike" cap="none" normalizeH="0" baseline="0" dirty="0" smtClean="0">
                 <a:ln>
                   <a:noFill/>
                 </a:ln>
@@ -5519,7 +5709,7 @@
               <a:t>    &lt;</a:t>
             </a:r>
             <a:r>
-              <a:rPr kumimoji="0" lang="de-DE" altLang="de-DE" sz="1600" b="1" i="0" u="none" strike="noStrike" cap="none" normalizeH="0" baseline="0" dirty="0" err="1" smtClean="0">
+              <a:rPr kumimoji="0" lang="de-DE" altLang="de-DE" sz="1800" b="1" i="0" u="none" strike="noStrike" cap="none" normalizeH="0" baseline="0" dirty="0" err="1" smtClean="0">
                 <a:ln>
                   <a:noFill/>
                 </a:ln>
@@ -5533,7 +5723,7 @@
               <a:t>version</a:t>
             </a:r>
             <a:r>
-              <a:rPr kumimoji="0" lang="de-DE" altLang="de-DE" sz="1600" b="0" i="0" u="none" strike="noStrike" cap="none" normalizeH="0" baseline="0" dirty="0" smtClean="0">
+              <a:rPr kumimoji="0" lang="de-DE" altLang="de-DE" sz="1800" b="0" i="0" u="none" strike="noStrike" cap="none" normalizeH="0" baseline="0" dirty="0" smtClean="0">
                 <a:ln>
                   <a:noFill/>
                 </a:ln>
@@ -5547,7 +5737,7 @@
               <a:t>&gt;1.9.5&lt;/</a:t>
             </a:r>
             <a:r>
-              <a:rPr kumimoji="0" lang="de-DE" altLang="de-DE" sz="1600" b="1" i="0" u="none" strike="noStrike" cap="none" normalizeH="0" baseline="0" dirty="0" err="1" smtClean="0">
+              <a:rPr kumimoji="0" lang="de-DE" altLang="de-DE" sz="1800" b="1" i="0" u="none" strike="noStrike" cap="none" normalizeH="0" baseline="0" dirty="0" err="1" smtClean="0">
                 <a:ln>
                   <a:noFill/>
                 </a:ln>
@@ -5561,7 +5751,7 @@
               <a:t>version</a:t>
             </a:r>
             <a:r>
-              <a:rPr kumimoji="0" lang="de-DE" altLang="de-DE" sz="1600" b="0" i="0" u="none" strike="noStrike" cap="none" normalizeH="0" baseline="0" dirty="0" smtClean="0">
+              <a:rPr kumimoji="0" lang="de-DE" altLang="de-DE" sz="1800" b="0" i="0" u="none" strike="noStrike" cap="none" normalizeH="0" baseline="0" dirty="0" smtClean="0">
                 <a:ln>
                   <a:noFill/>
                 </a:ln>
@@ -5575,7 +5765,7 @@
               <a:t>&gt;</a:t>
             </a:r>
             <a:br>
-              <a:rPr kumimoji="0" lang="de-DE" altLang="de-DE" sz="1600" b="0" i="0" u="none" strike="noStrike" cap="none" normalizeH="0" baseline="0" dirty="0" smtClean="0">
+              <a:rPr kumimoji="0" lang="de-DE" altLang="de-DE" sz="1800" b="0" i="0" u="none" strike="noStrike" cap="none" normalizeH="0" baseline="0" dirty="0" smtClean="0">
                 <a:ln>
                   <a:noFill/>
                 </a:ln>
@@ -5588,7 +5778,7 @@
               </a:rPr>
             </a:br>
             <a:r>
-              <a:rPr kumimoji="0" lang="de-DE" altLang="de-DE" sz="1600" b="0" i="0" u="none" strike="noStrike" cap="none" normalizeH="0" baseline="0" dirty="0" smtClean="0">
+              <a:rPr kumimoji="0" lang="de-DE" altLang="de-DE" sz="1800" b="0" i="0" u="none" strike="noStrike" cap="none" normalizeH="0" baseline="0" dirty="0" smtClean="0">
                 <a:ln>
                   <a:noFill/>
                 </a:ln>
@@ -5602,7 +5792,7 @@
               <a:t>    </a:t>
             </a:r>
             <a:r>
-              <a:rPr kumimoji="0" lang="de-DE" altLang="de-DE" sz="1600" b="0" i="0" u="none" strike="noStrike" cap="none" normalizeH="0" baseline="0" dirty="0" smtClean="0">
+              <a:rPr kumimoji="0" lang="de-DE" altLang="de-DE" sz="1800" b="0" i="0" u="none" strike="noStrike" cap="none" normalizeH="0" baseline="0" dirty="0" smtClean="0">
                 <a:ln>
                   <a:noFill/>
                 </a:ln>
@@ -5616,7 +5806,7 @@
               <a:t>&lt;</a:t>
             </a:r>
             <a:r>
-              <a:rPr kumimoji="0" lang="de-DE" altLang="de-DE" sz="1600" b="1" i="0" u="none" strike="noStrike" cap="none" normalizeH="0" baseline="0" dirty="0" err="1" smtClean="0">
+              <a:rPr kumimoji="0" lang="de-DE" altLang="de-DE" sz="1800" b="1" i="0" u="none" strike="noStrike" cap="none" normalizeH="0" baseline="0" dirty="0" err="1" smtClean="0">
                 <a:ln>
                   <a:noFill/>
                 </a:ln>
@@ -5630,7 +5820,7 @@
               <a:t>scope</a:t>
             </a:r>
             <a:r>
-              <a:rPr kumimoji="0" lang="de-DE" altLang="de-DE" sz="1600" b="0" i="0" u="none" strike="noStrike" cap="none" normalizeH="0" baseline="0" dirty="0" smtClean="0">
+              <a:rPr kumimoji="0" lang="de-DE" altLang="de-DE" sz="1800" b="0" i="0" u="none" strike="noStrike" cap="none" normalizeH="0" baseline="0" dirty="0" smtClean="0">
                 <a:ln>
                   <a:noFill/>
                 </a:ln>
@@ -5644,7 +5834,7 @@
               <a:t>&gt;</a:t>
             </a:r>
             <a:r>
-              <a:rPr kumimoji="0" lang="de-DE" altLang="de-DE" sz="1600" b="0" i="0" u="none" strike="noStrike" cap="none" normalizeH="0" baseline="0" dirty="0" err="1" smtClean="0">
+              <a:rPr kumimoji="0" lang="de-DE" altLang="de-DE" sz="1800" b="0" i="0" u="none" strike="noStrike" cap="none" normalizeH="0" baseline="0" dirty="0" err="1" smtClean="0">
                 <a:ln>
                   <a:noFill/>
                 </a:ln>
@@ -5658,7 +5848,7 @@
               <a:t>test</a:t>
             </a:r>
             <a:r>
-              <a:rPr kumimoji="0" lang="de-DE" altLang="de-DE" sz="1600" b="0" i="0" u="none" strike="noStrike" cap="none" normalizeH="0" baseline="0" dirty="0" smtClean="0">
+              <a:rPr kumimoji="0" lang="de-DE" altLang="de-DE" sz="1800" b="0" i="0" u="none" strike="noStrike" cap="none" normalizeH="0" baseline="0" dirty="0" smtClean="0">
                 <a:ln>
                   <a:noFill/>
                 </a:ln>
@@ -5672,7 +5862,7 @@
               <a:t>&lt;/</a:t>
             </a:r>
             <a:r>
-              <a:rPr kumimoji="0" lang="de-DE" altLang="de-DE" sz="1600" b="1" i="0" u="none" strike="noStrike" cap="none" normalizeH="0" baseline="0" dirty="0" err="1" smtClean="0">
+              <a:rPr kumimoji="0" lang="de-DE" altLang="de-DE" sz="1800" b="1" i="0" u="none" strike="noStrike" cap="none" normalizeH="0" baseline="0" dirty="0" err="1" smtClean="0">
                 <a:ln>
                   <a:noFill/>
                 </a:ln>
@@ -5686,7 +5876,7 @@
               <a:t>scope</a:t>
             </a:r>
             <a:r>
-              <a:rPr kumimoji="0" lang="de-DE" altLang="de-DE" sz="1600" b="0" i="0" u="none" strike="noStrike" cap="none" normalizeH="0" baseline="0" dirty="0" smtClean="0">
+              <a:rPr kumimoji="0" lang="de-DE" altLang="de-DE" sz="1800" b="0" i="0" u="none" strike="noStrike" cap="none" normalizeH="0" baseline="0" dirty="0" smtClean="0">
                 <a:ln>
                   <a:noFill/>
                 </a:ln>
@@ -5700,7 +5890,7 @@
               <a:t>&gt;</a:t>
             </a:r>
             <a:r>
-              <a:rPr kumimoji="0" lang="de-DE" altLang="de-DE" sz="1600" b="0" i="0" u="none" strike="noStrike" cap="none" normalizeH="0" baseline="0" dirty="0" smtClean="0">
+              <a:rPr kumimoji="0" lang="de-DE" altLang="de-DE" sz="1800" b="0" i="0" u="none" strike="noStrike" cap="none" normalizeH="0" baseline="0" dirty="0" smtClean="0">
                 <a:ln>
                   <a:noFill/>
                 </a:ln>
@@ -5714,7 +5904,7 @@
               <a:t/>
             </a:r>
             <a:br>
-              <a:rPr kumimoji="0" lang="de-DE" altLang="de-DE" sz="1600" b="0" i="0" u="none" strike="noStrike" cap="none" normalizeH="0" baseline="0" dirty="0" smtClean="0">
+              <a:rPr kumimoji="0" lang="de-DE" altLang="de-DE" sz="1800" b="0" i="0" u="none" strike="noStrike" cap="none" normalizeH="0" baseline="0" dirty="0" smtClean="0">
                 <a:ln>
                   <a:noFill/>
                 </a:ln>
@@ -5727,7 +5917,7 @@
               </a:rPr>
             </a:br>
             <a:r>
-              <a:rPr kumimoji="0" lang="de-DE" altLang="de-DE" sz="1600" b="0" i="0" u="none" strike="noStrike" cap="none" normalizeH="0" baseline="0" dirty="0" smtClean="0">
+              <a:rPr kumimoji="0" lang="de-DE" altLang="de-DE" sz="1800" b="0" i="0" u="none" strike="noStrike" cap="none" normalizeH="0" baseline="0" dirty="0" smtClean="0">
                 <a:ln>
                   <a:noFill/>
                 </a:ln>
@@ -5741,7 +5931,7 @@
               <a:t>&lt;/</a:t>
             </a:r>
             <a:r>
-              <a:rPr kumimoji="0" lang="de-DE" altLang="de-DE" sz="1600" b="1" i="0" u="none" strike="noStrike" cap="none" normalizeH="0" baseline="0" dirty="0" err="1" smtClean="0">
+              <a:rPr kumimoji="0" lang="de-DE" altLang="de-DE" sz="1800" b="1" i="0" u="none" strike="noStrike" cap="none" normalizeH="0" baseline="0" dirty="0" err="1" smtClean="0">
                 <a:ln>
                   <a:noFill/>
                 </a:ln>
@@ -5755,7 +5945,7 @@
               <a:t>dependency</a:t>
             </a:r>
             <a:r>
-              <a:rPr kumimoji="0" lang="de-DE" altLang="de-DE" sz="1600" b="0" i="0" u="none" strike="noStrike" cap="none" normalizeH="0" baseline="0" dirty="0" smtClean="0">
+              <a:rPr kumimoji="0" lang="de-DE" altLang="de-DE" sz="1800" b="0" i="0" u="none" strike="noStrike" cap="none" normalizeH="0" baseline="0" dirty="0" smtClean="0">
                 <a:ln>
                   <a:noFill/>
                 </a:ln>
@@ -5769,7 +5959,7 @@
               <a:t>&gt;</a:t>
             </a:r>
             <a:br>
-              <a:rPr kumimoji="0" lang="de-DE" altLang="de-DE" sz="1600" b="0" i="0" u="none" strike="noStrike" cap="none" normalizeH="0" baseline="0" dirty="0" smtClean="0">
+              <a:rPr kumimoji="0" lang="de-DE" altLang="de-DE" sz="1800" b="0" i="0" u="none" strike="noStrike" cap="none" normalizeH="0" baseline="0" dirty="0" smtClean="0">
                 <a:ln>
                   <a:noFill/>
                 </a:ln>
@@ -5782,7 +5972,7 @@
               </a:rPr>
             </a:br>
             <a:r>
-              <a:rPr kumimoji="0" lang="de-DE" altLang="de-DE" sz="1600" b="0" i="0" u="none" strike="noStrike" cap="none" normalizeH="0" baseline="0" dirty="0" smtClean="0">
+              <a:rPr kumimoji="0" lang="de-DE" altLang="de-DE" sz="1800" b="0" i="0" u="none" strike="noStrike" cap="none" normalizeH="0" baseline="0" dirty="0" smtClean="0">
                 <a:ln>
                   <a:noFill/>
                 </a:ln>
@@ -5796,7 +5986,7 @@
               <a:t/>
             </a:r>
             <a:br>
-              <a:rPr kumimoji="0" lang="de-DE" altLang="de-DE" sz="1600" b="0" i="0" u="none" strike="noStrike" cap="none" normalizeH="0" baseline="0" dirty="0" smtClean="0">
+              <a:rPr kumimoji="0" lang="de-DE" altLang="de-DE" sz="1800" b="0" i="0" u="none" strike="noStrike" cap="none" normalizeH="0" baseline="0" dirty="0" smtClean="0">
                 <a:ln>
                   <a:noFill/>
                 </a:ln>
@@ -5809,7 +5999,7 @@
               </a:rPr>
             </a:br>
             <a:r>
-              <a:rPr kumimoji="0" lang="de-DE" altLang="de-DE" sz="1600" b="0" i="0" u="none" strike="noStrike" cap="none" normalizeH="0" baseline="0" dirty="0" smtClean="0">
+              <a:rPr kumimoji="0" lang="de-DE" altLang="de-DE" sz="1800" b="0" i="0" u="none" strike="noStrike" cap="none" normalizeH="0" baseline="0" dirty="0" smtClean="0">
                 <a:ln>
                   <a:noFill/>
                 </a:ln>
@@ -5823,7 +6013,7 @@
               <a:t>&lt;</a:t>
             </a:r>
             <a:r>
-              <a:rPr kumimoji="0" lang="de-DE" altLang="de-DE" sz="1600" b="1" i="0" u="none" strike="noStrike" cap="none" normalizeH="0" baseline="0" dirty="0" err="1" smtClean="0">
+              <a:rPr kumimoji="0" lang="de-DE" altLang="de-DE" sz="1800" b="1" i="0" u="none" strike="noStrike" cap="none" normalizeH="0" baseline="0" dirty="0" err="1" smtClean="0">
                 <a:ln>
                   <a:noFill/>
                 </a:ln>
@@ -5837,7 +6027,7 @@
               <a:t>dependency</a:t>
             </a:r>
             <a:r>
-              <a:rPr kumimoji="0" lang="de-DE" altLang="de-DE" sz="1600" b="0" i="0" u="none" strike="noStrike" cap="none" normalizeH="0" baseline="0" dirty="0" smtClean="0">
+              <a:rPr kumimoji="0" lang="de-DE" altLang="de-DE" sz="1800" b="0" i="0" u="none" strike="noStrike" cap="none" normalizeH="0" baseline="0" dirty="0" smtClean="0">
                 <a:ln>
                   <a:noFill/>
                 </a:ln>
@@ -5851,7 +6041,7 @@
               <a:t>&gt;</a:t>
             </a:r>
             <a:br>
-              <a:rPr kumimoji="0" lang="de-DE" altLang="de-DE" sz="1600" b="0" i="0" u="none" strike="noStrike" cap="none" normalizeH="0" baseline="0" dirty="0" smtClean="0">
+              <a:rPr kumimoji="0" lang="de-DE" altLang="de-DE" sz="1800" b="0" i="0" u="none" strike="noStrike" cap="none" normalizeH="0" baseline="0" dirty="0" smtClean="0">
                 <a:ln>
                   <a:noFill/>
                 </a:ln>
@@ -5864,7 +6054,7 @@
               </a:rPr>
             </a:br>
             <a:r>
-              <a:rPr kumimoji="0" lang="de-DE" altLang="de-DE" sz="1600" b="0" i="0" u="none" strike="noStrike" cap="none" normalizeH="0" baseline="0" dirty="0" smtClean="0">
+              <a:rPr kumimoji="0" lang="de-DE" altLang="de-DE" sz="1800" b="0" i="0" u="none" strike="noStrike" cap="none" normalizeH="0" baseline="0" dirty="0" smtClean="0">
                 <a:ln>
                   <a:noFill/>
                 </a:ln>
@@ -5878,7 +6068,7 @@
               <a:t>    &lt;</a:t>
             </a:r>
             <a:r>
-              <a:rPr kumimoji="0" lang="de-DE" altLang="de-DE" sz="1600" b="1" i="0" u="none" strike="noStrike" cap="none" normalizeH="0" baseline="0" dirty="0" err="1" smtClean="0">
+              <a:rPr kumimoji="0" lang="de-DE" altLang="de-DE" sz="1800" b="1" i="0" u="none" strike="noStrike" cap="none" normalizeH="0" baseline="0" dirty="0" err="1" smtClean="0">
                 <a:ln>
                   <a:noFill/>
                 </a:ln>
@@ -5892,7 +6082,7 @@
               <a:t>groupId</a:t>
             </a:r>
             <a:r>
-              <a:rPr kumimoji="0" lang="de-DE" altLang="de-DE" sz="1600" b="0" i="0" u="none" strike="noStrike" cap="none" normalizeH="0" baseline="0" dirty="0" smtClean="0">
+              <a:rPr kumimoji="0" lang="de-DE" altLang="de-DE" sz="1800" b="0" i="0" u="none" strike="noStrike" cap="none" normalizeH="0" baseline="0" dirty="0" smtClean="0">
                 <a:ln>
                   <a:noFill/>
                 </a:ln>
@@ -5906,7 +6096,7 @@
               <a:t>&gt;</a:t>
             </a:r>
             <a:r>
-              <a:rPr kumimoji="0" lang="de-DE" altLang="de-DE" sz="1600" b="0" i="0" u="none" strike="noStrike" cap="none" normalizeH="0" baseline="0" dirty="0" err="1" smtClean="0">
+              <a:rPr kumimoji="0" lang="de-DE" altLang="de-DE" sz="1800" b="0" i="0" u="none" strike="noStrike" cap="none" normalizeH="0" baseline="0" dirty="0" err="1" smtClean="0">
                 <a:ln>
                   <a:noFill/>
                 </a:ln>
@@ -5920,7 +6110,7 @@
               <a:t>org.controlsfx</a:t>
             </a:r>
             <a:r>
-              <a:rPr kumimoji="0" lang="de-DE" altLang="de-DE" sz="1600" b="0" i="0" u="none" strike="noStrike" cap="none" normalizeH="0" baseline="0" dirty="0" smtClean="0">
+              <a:rPr kumimoji="0" lang="de-DE" altLang="de-DE" sz="1800" b="0" i="0" u="none" strike="noStrike" cap="none" normalizeH="0" baseline="0" dirty="0" smtClean="0">
                 <a:ln>
                   <a:noFill/>
                 </a:ln>
@@ -5934,7 +6124,7 @@
               <a:t>&lt;/</a:t>
             </a:r>
             <a:r>
-              <a:rPr kumimoji="0" lang="de-DE" altLang="de-DE" sz="1600" b="1" i="0" u="none" strike="noStrike" cap="none" normalizeH="0" baseline="0" dirty="0" err="1" smtClean="0">
+              <a:rPr kumimoji="0" lang="de-DE" altLang="de-DE" sz="1800" b="1" i="0" u="none" strike="noStrike" cap="none" normalizeH="0" baseline="0" dirty="0" err="1" smtClean="0">
                 <a:ln>
                   <a:noFill/>
                 </a:ln>
@@ -5948,7 +6138,7 @@
               <a:t>groupId</a:t>
             </a:r>
             <a:r>
-              <a:rPr kumimoji="0" lang="de-DE" altLang="de-DE" sz="1600" b="0" i="0" u="none" strike="noStrike" cap="none" normalizeH="0" baseline="0" dirty="0" smtClean="0">
+              <a:rPr kumimoji="0" lang="de-DE" altLang="de-DE" sz="1800" b="0" i="0" u="none" strike="noStrike" cap="none" normalizeH="0" baseline="0" dirty="0" smtClean="0">
                 <a:ln>
                   <a:noFill/>
                 </a:ln>
@@ -5962,7 +6152,7 @@
               <a:t>&gt;</a:t>
             </a:r>
             <a:br>
-              <a:rPr kumimoji="0" lang="de-DE" altLang="de-DE" sz="1600" b="0" i="0" u="none" strike="noStrike" cap="none" normalizeH="0" baseline="0" dirty="0" smtClean="0">
+              <a:rPr kumimoji="0" lang="de-DE" altLang="de-DE" sz="1800" b="0" i="0" u="none" strike="noStrike" cap="none" normalizeH="0" baseline="0" dirty="0" smtClean="0">
                 <a:ln>
                   <a:noFill/>
                 </a:ln>
@@ -5975,7 +6165,7 @@
               </a:rPr>
             </a:br>
             <a:r>
-              <a:rPr kumimoji="0" lang="de-DE" altLang="de-DE" sz="1600" b="0" i="0" u="none" strike="noStrike" cap="none" normalizeH="0" baseline="0" dirty="0" smtClean="0">
+              <a:rPr kumimoji="0" lang="de-DE" altLang="de-DE" sz="1800" b="0" i="0" u="none" strike="noStrike" cap="none" normalizeH="0" baseline="0" dirty="0" smtClean="0">
                 <a:ln>
                   <a:noFill/>
                 </a:ln>
@@ -5989,7 +6179,7 @@
               <a:t>    &lt;</a:t>
             </a:r>
             <a:r>
-              <a:rPr kumimoji="0" lang="de-DE" altLang="de-DE" sz="1600" b="1" i="0" u="none" strike="noStrike" cap="none" normalizeH="0" baseline="0" dirty="0" err="1" smtClean="0">
+              <a:rPr kumimoji="0" lang="de-DE" altLang="de-DE" sz="1800" b="1" i="0" u="none" strike="noStrike" cap="none" normalizeH="0" baseline="0" dirty="0" err="1" smtClean="0">
                 <a:ln>
                   <a:noFill/>
                 </a:ln>
@@ -6003,7 +6193,7 @@
               <a:t>artifactId</a:t>
             </a:r>
             <a:r>
-              <a:rPr kumimoji="0" lang="de-DE" altLang="de-DE" sz="1600" b="0" i="0" u="none" strike="noStrike" cap="none" normalizeH="0" baseline="0" dirty="0" smtClean="0">
+              <a:rPr kumimoji="0" lang="de-DE" altLang="de-DE" sz="1800" b="0" i="0" u="none" strike="noStrike" cap="none" normalizeH="0" baseline="0" dirty="0" smtClean="0">
                 <a:ln>
                   <a:noFill/>
                 </a:ln>
@@ -6017,7 +6207,7 @@
               <a:t>&gt;</a:t>
             </a:r>
             <a:r>
-              <a:rPr kumimoji="0" lang="de-DE" altLang="de-DE" sz="1600" b="0" i="0" u="none" strike="noStrike" cap="none" normalizeH="0" baseline="0" dirty="0" err="1" smtClean="0">
+              <a:rPr kumimoji="0" lang="de-DE" altLang="de-DE" sz="1800" b="0" i="0" u="none" strike="noStrike" cap="none" normalizeH="0" baseline="0" dirty="0" err="1" smtClean="0">
                 <a:ln>
                   <a:noFill/>
                 </a:ln>
@@ -6031,7 +6221,7 @@
               <a:t>controlsfx</a:t>
             </a:r>
             <a:r>
-              <a:rPr kumimoji="0" lang="de-DE" altLang="de-DE" sz="1600" b="0" i="0" u="none" strike="noStrike" cap="none" normalizeH="0" baseline="0" dirty="0" smtClean="0">
+              <a:rPr kumimoji="0" lang="de-DE" altLang="de-DE" sz="1800" b="0" i="0" u="none" strike="noStrike" cap="none" normalizeH="0" baseline="0" dirty="0" smtClean="0">
                 <a:ln>
                   <a:noFill/>
                 </a:ln>
@@ -6045,7 +6235,7 @@
               <a:t>&lt;/</a:t>
             </a:r>
             <a:r>
-              <a:rPr kumimoji="0" lang="de-DE" altLang="de-DE" sz="1600" b="1" i="0" u="none" strike="noStrike" cap="none" normalizeH="0" baseline="0" dirty="0" err="1" smtClean="0">
+              <a:rPr kumimoji="0" lang="de-DE" altLang="de-DE" sz="1800" b="1" i="0" u="none" strike="noStrike" cap="none" normalizeH="0" baseline="0" dirty="0" err="1" smtClean="0">
                 <a:ln>
                   <a:noFill/>
                 </a:ln>
@@ -6059,7 +6249,7 @@
               <a:t>artifactId</a:t>
             </a:r>
             <a:r>
-              <a:rPr kumimoji="0" lang="de-DE" altLang="de-DE" sz="1600" b="0" i="0" u="none" strike="noStrike" cap="none" normalizeH="0" baseline="0" dirty="0" smtClean="0">
+              <a:rPr kumimoji="0" lang="de-DE" altLang="de-DE" sz="1800" b="0" i="0" u="none" strike="noStrike" cap="none" normalizeH="0" baseline="0" dirty="0" smtClean="0">
                 <a:ln>
                   <a:noFill/>
                 </a:ln>
@@ -6073,7 +6263,7 @@
               <a:t>&gt;</a:t>
             </a:r>
             <a:br>
-              <a:rPr kumimoji="0" lang="de-DE" altLang="de-DE" sz="1600" b="0" i="0" u="none" strike="noStrike" cap="none" normalizeH="0" baseline="0" dirty="0" smtClean="0">
+              <a:rPr kumimoji="0" lang="de-DE" altLang="de-DE" sz="1800" b="0" i="0" u="none" strike="noStrike" cap="none" normalizeH="0" baseline="0" dirty="0" smtClean="0">
                 <a:ln>
                   <a:noFill/>
                 </a:ln>
@@ -6086,7 +6276,7 @@
               </a:rPr>
             </a:br>
             <a:r>
-              <a:rPr kumimoji="0" lang="de-DE" altLang="de-DE" sz="1600" b="0" i="0" u="none" strike="noStrike" cap="none" normalizeH="0" baseline="0" dirty="0" smtClean="0">
+              <a:rPr kumimoji="0" lang="de-DE" altLang="de-DE" sz="1800" b="0" i="0" u="none" strike="noStrike" cap="none" normalizeH="0" baseline="0" dirty="0" smtClean="0">
                 <a:ln>
                   <a:noFill/>
                 </a:ln>
@@ -6100,7 +6290,7 @@
               <a:t>    &lt;</a:t>
             </a:r>
             <a:r>
-              <a:rPr kumimoji="0" lang="de-DE" altLang="de-DE" sz="1600" b="1" i="0" u="none" strike="noStrike" cap="none" normalizeH="0" baseline="0" dirty="0" err="1" smtClean="0">
+              <a:rPr kumimoji="0" lang="de-DE" altLang="de-DE" sz="1800" b="1" i="0" u="none" strike="noStrike" cap="none" normalizeH="0" baseline="0" dirty="0" err="1" smtClean="0">
                 <a:ln>
                   <a:noFill/>
                 </a:ln>
@@ -6114,7 +6304,7 @@
               <a:t>version</a:t>
             </a:r>
             <a:r>
-              <a:rPr kumimoji="0" lang="de-DE" altLang="de-DE" sz="1600" b="0" i="0" u="none" strike="noStrike" cap="none" normalizeH="0" baseline="0" dirty="0" smtClean="0">
+              <a:rPr kumimoji="0" lang="de-DE" altLang="de-DE" sz="1800" b="0" i="0" u="none" strike="noStrike" cap="none" normalizeH="0" baseline="0" dirty="0" smtClean="0">
                 <a:ln>
                   <a:noFill/>
                 </a:ln>
@@ -6128,7 +6318,7 @@
               <a:t>&gt;8.40.10&lt;/</a:t>
             </a:r>
             <a:r>
-              <a:rPr kumimoji="0" lang="de-DE" altLang="de-DE" sz="1600" b="1" i="0" u="none" strike="noStrike" cap="none" normalizeH="0" baseline="0" dirty="0" err="1" smtClean="0">
+              <a:rPr kumimoji="0" lang="de-DE" altLang="de-DE" sz="1800" b="1" i="0" u="none" strike="noStrike" cap="none" normalizeH="0" baseline="0" dirty="0" err="1" smtClean="0">
                 <a:ln>
                   <a:noFill/>
                 </a:ln>
@@ -6142,7 +6332,7 @@
               <a:t>version</a:t>
             </a:r>
             <a:r>
-              <a:rPr kumimoji="0" lang="de-DE" altLang="de-DE" sz="1600" b="0" i="0" u="none" strike="noStrike" cap="none" normalizeH="0" baseline="0" dirty="0" smtClean="0">
+              <a:rPr kumimoji="0" lang="de-DE" altLang="de-DE" sz="1800" b="0" i="0" u="none" strike="noStrike" cap="none" normalizeH="0" baseline="0" dirty="0" smtClean="0">
                 <a:ln>
                   <a:noFill/>
                 </a:ln>
@@ -6156,7 +6346,7 @@
               <a:t>&gt;</a:t>
             </a:r>
             <a:br>
-              <a:rPr kumimoji="0" lang="de-DE" altLang="de-DE" sz="1600" b="0" i="0" u="none" strike="noStrike" cap="none" normalizeH="0" baseline="0" dirty="0" smtClean="0">
+              <a:rPr kumimoji="0" lang="de-DE" altLang="de-DE" sz="1800" b="0" i="0" u="none" strike="noStrike" cap="none" normalizeH="0" baseline="0" dirty="0" smtClean="0">
                 <a:ln>
                   <a:noFill/>
                 </a:ln>
@@ -6169,7 +6359,7 @@
               </a:rPr>
             </a:br>
             <a:r>
-              <a:rPr kumimoji="0" lang="de-DE" altLang="de-DE" sz="1600" b="0" i="0" u="none" strike="noStrike" cap="none" normalizeH="0" baseline="0" dirty="0" smtClean="0">
+              <a:rPr kumimoji="0" lang="de-DE" altLang="de-DE" sz="1800" b="0" i="0" u="none" strike="noStrike" cap="none" normalizeH="0" baseline="0" dirty="0" smtClean="0">
                 <a:ln>
                   <a:noFill/>
                 </a:ln>
@@ -6183,7 +6373,7 @@
               <a:t>&lt;/</a:t>
             </a:r>
             <a:r>
-              <a:rPr kumimoji="0" lang="de-DE" altLang="de-DE" sz="1600" b="1" i="0" u="none" strike="noStrike" cap="none" normalizeH="0" baseline="0" dirty="0" err="1" smtClean="0">
+              <a:rPr kumimoji="0" lang="de-DE" altLang="de-DE" sz="1800" b="1" i="0" u="none" strike="noStrike" cap="none" normalizeH="0" baseline="0" dirty="0" err="1" smtClean="0">
                 <a:ln>
                   <a:noFill/>
                 </a:ln>
@@ -6197,7 +6387,7 @@
               <a:t>dependency</a:t>
             </a:r>
             <a:r>
-              <a:rPr kumimoji="0" lang="de-DE" altLang="de-DE" sz="1600" b="0" i="0" u="none" strike="noStrike" cap="none" normalizeH="0" baseline="0" dirty="0" smtClean="0">
+              <a:rPr kumimoji="0" lang="de-DE" altLang="de-DE" sz="1800" b="0" i="0" u="none" strike="noStrike" cap="none" normalizeH="0" baseline="0" dirty="0" smtClean="0">
                 <a:ln>
                   <a:noFill/>
                 </a:ln>
@@ -6210,7 +6400,7 @@
               </a:rPr>
               <a:t>&gt;</a:t>
             </a:r>
-            <a:endParaRPr kumimoji="0" lang="de-DE" altLang="de-DE" sz="1600" b="0" i="0" u="none" strike="noStrike" cap="none" normalizeH="0" baseline="0" dirty="0" smtClean="0">
+            <a:endParaRPr kumimoji="0" lang="de-DE" altLang="de-DE" sz="1800" b="0" i="0" u="none" strike="noStrike" cap="none" normalizeH="0" baseline="0" dirty="0" smtClean="0">
               <a:ln>
                 <a:noFill/>
               </a:ln>
@@ -6281,7 +6471,7 @@
                   <a:srgbClr val="000000"/>
                 </a:solidFill>
               </a:rPr>
-              <a:t>29.05.2016</a:t>
+              <a:t>14.06.2016</a:t>
             </a:fld>
             <a:endParaRPr lang="de-CH">
               <a:solidFill>
@@ -6337,6 +6527,1357 @@
               </a:rPr>
               <a:pPr/>
               <a:t>13</a:t>
+            </a:fld>
+            <a:endParaRPr lang="de-CH">
+              <a:solidFill>
+                <a:srgbClr val="000000"/>
+              </a:solidFill>
+            </a:endParaRPr>
+          </a:p>
+        </p:txBody>
+      </p:sp>
+      <p:sp>
+        <p:nvSpPr>
+          <p:cNvPr id="5" name="Titel 4"/>
+          <p:cNvSpPr>
+            <a:spLocks noGrp="1"/>
+          </p:cNvSpPr>
+          <p:nvPr>
+            <p:ph type="title"/>
+          </p:nvPr>
+        </p:nvSpPr>
+        <p:spPr/>
+        <p:txBody>
+          <a:bodyPr/>
+          <a:lstStyle/>
+          <a:p>
+            <a:r>
+              <a:rPr lang="de-CH" dirty="0" smtClean="0"/>
+              <a:t>Simple </a:t>
+            </a:r>
+            <a:r>
+              <a:rPr lang="de-CH" dirty="0" err="1" smtClean="0"/>
+              <a:t>concurrent</a:t>
+            </a:r>
+            <a:r>
+              <a:rPr lang="de-CH" dirty="0" smtClean="0"/>
+              <a:t> </a:t>
+            </a:r>
+            <a:r>
+              <a:rPr lang="de-CH" dirty="0" err="1" smtClean="0"/>
+              <a:t>programming</a:t>
+            </a:r>
+            <a:endParaRPr lang="de-CH" dirty="0"/>
+          </a:p>
+        </p:txBody>
+      </p:sp>
+      <p:sp>
+        <p:nvSpPr>
+          <p:cNvPr id="6" name="Textplatzhalter 5"/>
+          <p:cNvSpPr>
+            <a:spLocks noGrp="1"/>
+          </p:cNvSpPr>
+          <p:nvPr>
+            <p:ph type="body" idx="1"/>
+          </p:nvPr>
+        </p:nvSpPr>
+        <p:spPr/>
+        <p:txBody>
+          <a:bodyPr/>
+          <a:lstStyle/>
+          <a:p>
+            <a:pPr marL="342900" indent="-342900">
+              <a:buFont typeface="Arial" panose="020B0604020202020204" pitchFamily="34" charset="0"/>
+              <a:buChar char="•"/>
+            </a:pPr>
+            <a:r>
+              <a:rPr lang="de-CH" dirty="0" smtClean="0"/>
+              <a:t>IO sollte nicht auch Main-Thread laufen</a:t>
+            </a:r>
+          </a:p>
+          <a:p>
+            <a:pPr marL="342900" indent="-342900">
+              <a:buFont typeface="Arial" panose="020B0604020202020204" pitchFamily="34" charset="0"/>
+              <a:buChar char="•"/>
+            </a:pPr>
+            <a:r>
+              <a:rPr lang="de-CH" dirty="0" err="1" smtClean="0"/>
+              <a:t>CompletableFuture</a:t>
+            </a:r>
+            <a:r>
+              <a:rPr lang="de-CH" dirty="0" smtClean="0"/>
+              <a:t> seit Java 8</a:t>
+            </a:r>
+            <a:endParaRPr lang="de-CH" dirty="0"/>
+          </a:p>
+        </p:txBody>
+      </p:sp>
+      <p:sp>
+        <p:nvSpPr>
+          <p:cNvPr id="7" name="Rectangle 1"/>
+          <p:cNvSpPr>
+            <a:spLocks noChangeArrowheads="1"/>
+          </p:cNvSpPr>
+          <p:nvPr/>
+        </p:nvSpPr>
+        <p:spPr bwMode="auto">
+          <a:xfrm>
+            <a:off x="728657" y="3713847"/>
+            <a:ext cx="9221794" cy="1938992"/>
+          </a:xfrm>
+          <a:prstGeom prst="rect">
+            <a:avLst/>
+          </a:prstGeom>
+          <a:ln/>
+        </p:spPr>
+        <p:style>
+          <a:lnRef idx="2">
+            <a:schemeClr val="accent4"/>
+          </a:lnRef>
+          <a:fillRef idx="1">
+            <a:schemeClr val="lt1"/>
+          </a:fillRef>
+          <a:effectRef idx="0">
+            <a:schemeClr val="accent4"/>
+          </a:effectRef>
+          <a:fontRef idx="minor">
+            <a:schemeClr val="dk1"/>
+          </a:fontRef>
+        </p:style>
+        <p:txBody>
+          <a:bodyPr vert="horz" wrap="square" lIns="91440" tIns="45720" rIns="91440" bIns="45720" numCol="1" anchor="ctr" anchorCtr="0" compatLnSpc="1">
+            <a:prstTxWarp prst="textNoShape">
+              <a:avLst/>
+            </a:prstTxWarp>
+            <a:spAutoFit/>
+          </a:bodyPr>
+          <a:lstStyle/>
+          <a:p>
+            <a:pPr marL="0" marR="0" lvl="0" indent="0" algn="l" defTabSz="914400" rtl="0" eaLnBrk="0" fontAlgn="base" latinLnBrk="0" hangingPunct="0">
+              <a:lnSpc>
+                <a:spcPct val="100000"/>
+              </a:lnSpc>
+              <a:spcBef>
+                <a:spcPct val="0"/>
+              </a:spcBef>
+              <a:spcAft>
+                <a:spcPct val="0"/>
+              </a:spcAft>
+              <a:buClrTx/>
+              <a:buSzTx/>
+              <a:buFontTx/>
+              <a:buNone/>
+              <a:tabLst/>
+            </a:pPr>
+            <a:r>
+              <a:rPr kumimoji="0" lang="de-DE" altLang="de-DE" sz="2000" b="1" i="0" u="none" strike="noStrike" cap="none" normalizeH="0" baseline="0" dirty="0" err="1" smtClean="0">
+                <a:ln>
+                  <a:noFill/>
+                </a:ln>
+                <a:solidFill>
+                  <a:srgbClr val="000080"/>
+                </a:solidFill>
+                <a:effectLst/>
+                <a:latin typeface="Courier New" panose="02070309020205020404" pitchFamily="49" charset="0"/>
+                <a:cs typeface="Courier New" panose="02070309020205020404" pitchFamily="49" charset="0"/>
+              </a:rPr>
+              <a:t>public</a:t>
+            </a:r>
+            <a:r>
+              <a:rPr kumimoji="0" lang="de-DE" altLang="de-DE" sz="2000" b="1" i="0" u="none" strike="noStrike" cap="none" normalizeH="0" baseline="0" dirty="0" smtClean="0">
+                <a:ln>
+                  <a:noFill/>
+                </a:ln>
+                <a:solidFill>
+                  <a:srgbClr val="000080"/>
+                </a:solidFill>
+                <a:effectLst/>
+                <a:latin typeface="Courier New" panose="02070309020205020404" pitchFamily="49" charset="0"/>
+                <a:cs typeface="Courier New" panose="02070309020205020404" pitchFamily="49" charset="0"/>
+              </a:rPr>
+              <a:t> </a:t>
+            </a:r>
+            <a:r>
+              <a:rPr kumimoji="0" lang="de-DE" altLang="de-DE" sz="2000" b="0" i="0" u="none" strike="noStrike" cap="none" normalizeH="0" baseline="0" dirty="0" err="1" smtClean="0">
+                <a:ln>
+                  <a:noFill/>
+                </a:ln>
+                <a:solidFill>
+                  <a:srgbClr val="000000"/>
+                </a:solidFill>
+                <a:effectLst/>
+                <a:latin typeface="Courier New" panose="02070309020205020404" pitchFamily="49" charset="0"/>
+                <a:cs typeface="Courier New" panose="02070309020205020404" pitchFamily="49" charset="0"/>
+              </a:rPr>
+              <a:t>CompletableFuture</a:t>
+            </a:r>
+            <a:r>
+              <a:rPr kumimoji="0" lang="de-DE" altLang="de-DE" sz="2000" b="0" i="0" u="none" strike="noStrike" cap="none" normalizeH="0" baseline="0" dirty="0" smtClean="0">
+                <a:ln>
+                  <a:noFill/>
+                </a:ln>
+                <a:solidFill>
+                  <a:srgbClr val="000000"/>
+                </a:solidFill>
+                <a:effectLst/>
+                <a:latin typeface="Courier New" panose="02070309020205020404" pitchFamily="49" charset="0"/>
+                <a:cs typeface="Courier New" panose="02070309020205020404" pitchFamily="49" charset="0"/>
+              </a:rPr>
+              <a:t>&lt;List&lt;Movie&gt;&gt; </a:t>
+            </a:r>
+            <a:r>
+              <a:rPr kumimoji="0" lang="de-DE" altLang="de-DE" sz="2000" b="0" i="0" u="none" strike="noStrike" cap="none" normalizeH="0" baseline="0" dirty="0" err="1" smtClean="0">
+                <a:ln>
+                  <a:noFill/>
+                </a:ln>
+                <a:solidFill>
+                  <a:srgbClr val="000000"/>
+                </a:solidFill>
+                <a:effectLst/>
+                <a:latin typeface="Courier New" panose="02070309020205020404" pitchFamily="49" charset="0"/>
+                <a:cs typeface="Courier New" panose="02070309020205020404" pitchFamily="49" charset="0"/>
+              </a:rPr>
+              <a:t>getMovies</a:t>
+            </a:r>
+            <a:r>
+              <a:rPr kumimoji="0" lang="de-DE" altLang="de-DE" sz="2000" b="0" i="0" u="none" strike="noStrike" cap="none" normalizeH="0" baseline="0" dirty="0" smtClean="0">
+                <a:ln>
+                  <a:noFill/>
+                </a:ln>
+                <a:solidFill>
+                  <a:srgbClr val="000000"/>
+                </a:solidFill>
+                <a:effectLst/>
+                <a:latin typeface="Courier New" panose="02070309020205020404" pitchFamily="49" charset="0"/>
+                <a:cs typeface="Courier New" panose="02070309020205020404" pitchFamily="49" charset="0"/>
+              </a:rPr>
+              <a:t>() {</a:t>
+            </a:r>
+            <a:br>
+              <a:rPr kumimoji="0" lang="de-DE" altLang="de-DE" sz="2000" b="0" i="0" u="none" strike="noStrike" cap="none" normalizeH="0" baseline="0" dirty="0" smtClean="0">
+                <a:ln>
+                  <a:noFill/>
+                </a:ln>
+                <a:solidFill>
+                  <a:srgbClr val="000000"/>
+                </a:solidFill>
+                <a:effectLst/>
+                <a:latin typeface="Courier New" panose="02070309020205020404" pitchFamily="49" charset="0"/>
+                <a:cs typeface="Courier New" panose="02070309020205020404" pitchFamily="49" charset="0"/>
+              </a:rPr>
+            </a:br>
+            <a:r>
+              <a:rPr kumimoji="0" lang="de-DE" altLang="de-DE" sz="2000" b="0" i="0" u="none" strike="noStrike" cap="none" normalizeH="0" baseline="0" dirty="0" smtClean="0">
+                <a:ln>
+                  <a:noFill/>
+                </a:ln>
+                <a:solidFill>
+                  <a:srgbClr val="000000"/>
+                </a:solidFill>
+                <a:effectLst/>
+                <a:latin typeface="Courier New" panose="02070309020205020404" pitchFamily="49" charset="0"/>
+                <a:cs typeface="Courier New" panose="02070309020205020404" pitchFamily="49" charset="0"/>
+              </a:rPr>
+              <a:t>    </a:t>
+            </a:r>
+            <a:r>
+              <a:rPr kumimoji="0" lang="de-DE" altLang="de-DE" sz="2000" b="1" i="0" u="none" strike="noStrike" cap="none" normalizeH="0" baseline="0" dirty="0" err="1" smtClean="0">
+                <a:ln>
+                  <a:noFill/>
+                </a:ln>
+                <a:solidFill>
+                  <a:srgbClr val="000080"/>
+                </a:solidFill>
+                <a:effectLst/>
+                <a:latin typeface="Courier New" panose="02070309020205020404" pitchFamily="49" charset="0"/>
+                <a:cs typeface="Courier New" panose="02070309020205020404" pitchFamily="49" charset="0"/>
+              </a:rPr>
+              <a:t>return</a:t>
+            </a:r>
+            <a:r>
+              <a:rPr kumimoji="0" lang="de-DE" altLang="de-DE" sz="2000" b="1" i="0" u="none" strike="noStrike" cap="none" normalizeH="0" baseline="0" dirty="0" smtClean="0">
+                <a:ln>
+                  <a:noFill/>
+                </a:ln>
+                <a:solidFill>
+                  <a:srgbClr val="000080"/>
+                </a:solidFill>
+                <a:effectLst/>
+                <a:latin typeface="Courier New" panose="02070309020205020404" pitchFamily="49" charset="0"/>
+                <a:cs typeface="Courier New" panose="02070309020205020404" pitchFamily="49" charset="0"/>
+              </a:rPr>
+              <a:t> </a:t>
+            </a:r>
+            <a:r>
+              <a:rPr kumimoji="0" lang="de-DE" altLang="de-DE" sz="2000" b="0" i="0" u="none" strike="noStrike" cap="none" normalizeH="0" baseline="0" dirty="0" err="1" smtClean="0">
+                <a:ln>
+                  <a:noFill/>
+                </a:ln>
+                <a:solidFill>
+                  <a:srgbClr val="000000"/>
+                </a:solidFill>
+                <a:effectLst/>
+                <a:latin typeface="Courier New" panose="02070309020205020404" pitchFamily="49" charset="0"/>
+                <a:cs typeface="Courier New" panose="02070309020205020404" pitchFamily="49" charset="0"/>
+              </a:rPr>
+              <a:t>CompletableFuture.</a:t>
+            </a:r>
+            <a:r>
+              <a:rPr kumimoji="0" lang="de-DE" altLang="de-DE" sz="2000" b="0" i="1" u="none" strike="noStrike" cap="none" normalizeH="0" baseline="0" dirty="0" err="1" smtClean="0">
+                <a:ln>
+                  <a:noFill/>
+                </a:ln>
+                <a:solidFill>
+                  <a:srgbClr val="000000"/>
+                </a:solidFill>
+                <a:effectLst/>
+                <a:latin typeface="Courier New" panose="02070309020205020404" pitchFamily="49" charset="0"/>
+                <a:cs typeface="Courier New" panose="02070309020205020404" pitchFamily="49" charset="0"/>
+              </a:rPr>
+              <a:t>supplyAsync</a:t>
+            </a:r>
+            <a:r>
+              <a:rPr kumimoji="0" lang="de-DE" altLang="de-DE" sz="2000" b="0" i="0" u="none" strike="noStrike" cap="none" normalizeH="0" baseline="0" dirty="0" smtClean="0">
+                <a:ln>
+                  <a:noFill/>
+                </a:ln>
+                <a:solidFill>
+                  <a:srgbClr val="000000"/>
+                </a:solidFill>
+                <a:effectLst/>
+                <a:latin typeface="Courier New" panose="02070309020205020404" pitchFamily="49" charset="0"/>
+                <a:cs typeface="Courier New" panose="02070309020205020404" pitchFamily="49" charset="0"/>
+              </a:rPr>
+              <a:t>(() -&gt; {</a:t>
+            </a:r>
+            <a:br>
+              <a:rPr kumimoji="0" lang="de-DE" altLang="de-DE" sz="2000" b="0" i="0" u="none" strike="noStrike" cap="none" normalizeH="0" baseline="0" dirty="0" smtClean="0">
+                <a:ln>
+                  <a:noFill/>
+                </a:ln>
+                <a:solidFill>
+                  <a:srgbClr val="000000"/>
+                </a:solidFill>
+                <a:effectLst/>
+                <a:latin typeface="Courier New" panose="02070309020205020404" pitchFamily="49" charset="0"/>
+                <a:cs typeface="Courier New" panose="02070309020205020404" pitchFamily="49" charset="0"/>
+              </a:rPr>
+            </a:br>
+            <a:r>
+              <a:rPr kumimoji="0" lang="de-DE" altLang="de-DE" sz="2000" b="0" i="0" u="none" strike="noStrike" cap="none" normalizeH="0" baseline="0" dirty="0" smtClean="0">
+                <a:ln>
+                  <a:noFill/>
+                </a:ln>
+                <a:solidFill>
+                  <a:srgbClr val="000000"/>
+                </a:solidFill>
+                <a:effectLst/>
+                <a:latin typeface="Courier New" panose="02070309020205020404" pitchFamily="49" charset="0"/>
+                <a:cs typeface="Courier New" panose="02070309020205020404" pitchFamily="49" charset="0"/>
+              </a:rPr>
+              <a:t>        </a:t>
+            </a:r>
+            <a:r>
+              <a:rPr kumimoji="0" lang="de-DE" altLang="de-DE" sz="2000" b="0" i="1" u="none" strike="noStrike" cap="none" normalizeH="0" baseline="0" dirty="0" smtClean="0">
+                <a:ln>
+                  <a:noFill/>
+                </a:ln>
+                <a:solidFill>
+                  <a:srgbClr val="808080"/>
+                </a:solidFill>
+                <a:effectLst/>
+                <a:latin typeface="Courier New" panose="02070309020205020404" pitchFamily="49" charset="0"/>
+                <a:cs typeface="Courier New" panose="02070309020205020404" pitchFamily="49" charset="0"/>
+              </a:rPr>
+              <a:t>// </a:t>
+            </a:r>
+            <a:r>
+              <a:rPr kumimoji="0" lang="de-DE" altLang="de-DE" sz="2000" b="0" i="1" u="none" strike="noStrike" cap="none" normalizeH="0" baseline="0" dirty="0" err="1" smtClean="0">
+                <a:ln>
+                  <a:noFill/>
+                </a:ln>
+                <a:solidFill>
+                  <a:srgbClr val="808080"/>
+                </a:solidFill>
+                <a:effectLst/>
+                <a:latin typeface="Courier New" panose="02070309020205020404" pitchFamily="49" charset="0"/>
+                <a:cs typeface="Courier New" panose="02070309020205020404" pitchFamily="49" charset="0"/>
+              </a:rPr>
+              <a:t>Blocking</a:t>
+            </a:r>
+            <a:r>
+              <a:rPr kumimoji="0" lang="de-DE" altLang="de-DE" sz="2000" b="0" i="1" u="none" strike="noStrike" cap="none" normalizeH="0" baseline="0" dirty="0" smtClean="0">
+                <a:ln>
+                  <a:noFill/>
+                </a:ln>
+                <a:solidFill>
+                  <a:srgbClr val="808080"/>
+                </a:solidFill>
+                <a:effectLst/>
+                <a:latin typeface="Courier New" panose="02070309020205020404" pitchFamily="49" charset="0"/>
+                <a:cs typeface="Courier New" panose="02070309020205020404" pitchFamily="49" charset="0"/>
+              </a:rPr>
+              <a:t> </a:t>
+            </a:r>
+            <a:r>
+              <a:rPr kumimoji="0" lang="de-DE" altLang="de-DE" sz="2000" b="0" i="1" u="none" strike="noStrike" cap="none" normalizeH="0" baseline="0" dirty="0" err="1" smtClean="0">
+                <a:ln>
+                  <a:noFill/>
+                </a:ln>
+                <a:solidFill>
+                  <a:srgbClr val="808080"/>
+                </a:solidFill>
+                <a:effectLst/>
+                <a:latin typeface="Courier New" panose="02070309020205020404" pitchFamily="49" charset="0"/>
+                <a:cs typeface="Courier New" panose="02070309020205020404" pitchFamily="49" charset="0"/>
+              </a:rPr>
+              <a:t>task</a:t>
+            </a:r>
+            <a:r>
+              <a:rPr kumimoji="0" lang="de-DE" altLang="de-DE" sz="2000" b="0" i="1" u="none" strike="noStrike" cap="none" normalizeH="0" baseline="0" dirty="0" smtClean="0">
+                <a:ln>
+                  <a:noFill/>
+                </a:ln>
+                <a:solidFill>
+                  <a:srgbClr val="808080"/>
+                </a:solidFill>
+                <a:effectLst/>
+                <a:latin typeface="Courier New" panose="02070309020205020404" pitchFamily="49" charset="0"/>
+                <a:cs typeface="Courier New" panose="02070309020205020404" pitchFamily="49" charset="0"/>
+              </a:rPr>
+              <a:t> …</a:t>
+            </a:r>
+            <a:br>
+              <a:rPr kumimoji="0" lang="de-DE" altLang="de-DE" sz="2000" b="0" i="1" u="none" strike="noStrike" cap="none" normalizeH="0" baseline="0" dirty="0" smtClean="0">
+                <a:ln>
+                  <a:noFill/>
+                </a:ln>
+                <a:solidFill>
+                  <a:srgbClr val="808080"/>
+                </a:solidFill>
+                <a:effectLst/>
+                <a:latin typeface="Courier New" panose="02070309020205020404" pitchFamily="49" charset="0"/>
+                <a:cs typeface="Courier New" panose="02070309020205020404" pitchFamily="49" charset="0"/>
+              </a:rPr>
+            </a:br>
+            <a:r>
+              <a:rPr kumimoji="0" lang="de-DE" altLang="de-DE" sz="2000" b="0" i="1" u="none" strike="noStrike" cap="none" normalizeH="0" baseline="0" dirty="0" smtClean="0">
+                <a:ln>
+                  <a:noFill/>
+                </a:ln>
+                <a:solidFill>
+                  <a:srgbClr val="808080"/>
+                </a:solidFill>
+                <a:effectLst/>
+                <a:latin typeface="Courier New" panose="02070309020205020404" pitchFamily="49" charset="0"/>
+                <a:cs typeface="Courier New" panose="02070309020205020404" pitchFamily="49" charset="0"/>
+              </a:rPr>
+              <a:t>        </a:t>
+            </a:r>
+            <a:r>
+              <a:rPr kumimoji="0" lang="de-DE" altLang="de-DE" sz="2000" b="1" i="0" u="none" strike="noStrike" cap="none" normalizeH="0" baseline="0" dirty="0" err="1" smtClean="0">
+                <a:ln>
+                  <a:noFill/>
+                </a:ln>
+                <a:solidFill>
+                  <a:srgbClr val="000080"/>
+                </a:solidFill>
+                <a:effectLst/>
+                <a:latin typeface="Courier New" panose="02070309020205020404" pitchFamily="49" charset="0"/>
+                <a:cs typeface="Courier New" panose="02070309020205020404" pitchFamily="49" charset="0"/>
+              </a:rPr>
+              <a:t>return</a:t>
+            </a:r>
+            <a:r>
+              <a:rPr kumimoji="0" lang="de-DE" altLang="de-DE" sz="2000" b="1" i="0" u="none" strike="noStrike" cap="none" normalizeH="0" baseline="0" dirty="0" smtClean="0">
+                <a:ln>
+                  <a:noFill/>
+                </a:ln>
+                <a:solidFill>
+                  <a:srgbClr val="000080"/>
+                </a:solidFill>
+                <a:effectLst/>
+                <a:latin typeface="Courier New" panose="02070309020205020404" pitchFamily="49" charset="0"/>
+                <a:cs typeface="Courier New" panose="02070309020205020404" pitchFamily="49" charset="0"/>
+              </a:rPr>
+              <a:t> </a:t>
+            </a:r>
+            <a:r>
+              <a:rPr kumimoji="0" lang="de-DE" altLang="de-DE" sz="2000" b="0" i="0" u="none" strike="noStrike" cap="none" normalizeH="0" baseline="0" dirty="0" err="1" smtClean="0">
+                <a:ln>
+                  <a:noFill/>
+                </a:ln>
+                <a:solidFill>
+                  <a:srgbClr val="000000"/>
+                </a:solidFill>
+                <a:effectLst/>
+                <a:latin typeface="Courier New" panose="02070309020205020404" pitchFamily="49" charset="0"/>
+                <a:cs typeface="Courier New" panose="02070309020205020404" pitchFamily="49" charset="0"/>
+              </a:rPr>
+              <a:t>Collections.</a:t>
+            </a:r>
+            <a:r>
+              <a:rPr kumimoji="0" lang="de-DE" altLang="de-DE" sz="2000" b="0" i="1" u="none" strike="noStrike" cap="none" normalizeH="0" baseline="0" dirty="0" err="1" smtClean="0">
+                <a:ln>
+                  <a:noFill/>
+                </a:ln>
+                <a:solidFill>
+                  <a:srgbClr val="000000"/>
+                </a:solidFill>
+                <a:effectLst/>
+                <a:latin typeface="Courier New" panose="02070309020205020404" pitchFamily="49" charset="0"/>
+                <a:cs typeface="Courier New" panose="02070309020205020404" pitchFamily="49" charset="0"/>
+              </a:rPr>
+              <a:t>emptyList</a:t>
+            </a:r>
+            <a:r>
+              <a:rPr kumimoji="0" lang="de-DE" altLang="de-DE" sz="2000" b="0" i="0" u="none" strike="noStrike" cap="none" normalizeH="0" baseline="0" dirty="0" smtClean="0">
+                <a:ln>
+                  <a:noFill/>
+                </a:ln>
+                <a:solidFill>
+                  <a:srgbClr val="000000"/>
+                </a:solidFill>
+                <a:effectLst/>
+                <a:latin typeface="Courier New" panose="02070309020205020404" pitchFamily="49" charset="0"/>
+                <a:cs typeface="Courier New" panose="02070309020205020404" pitchFamily="49" charset="0"/>
+              </a:rPr>
+              <a:t>();</a:t>
+            </a:r>
+            <a:br>
+              <a:rPr kumimoji="0" lang="de-DE" altLang="de-DE" sz="2000" b="0" i="0" u="none" strike="noStrike" cap="none" normalizeH="0" baseline="0" dirty="0" smtClean="0">
+                <a:ln>
+                  <a:noFill/>
+                </a:ln>
+                <a:solidFill>
+                  <a:srgbClr val="000000"/>
+                </a:solidFill>
+                <a:effectLst/>
+                <a:latin typeface="Courier New" panose="02070309020205020404" pitchFamily="49" charset="0"/>
+                <a:cs typeface="Courier New" panose="02070309020205020404" pitchFamily="49" charset="0"/>
+              </a:rPr>
+            </a:br>
+            <a:r>
+              <a:rPr kumimoji="0" lang="de-DE" altLang="de-DE" sz="2000" b="0" i="0" u="none" strike="noStrike" cap="none" normalizeH="0" baseline="0" dirty="0" smtClean="0">
+                <a:ln>
+                  <a:noFill/>
+                </a:ln>
+                <a:solidFill>
+                  <a:srgbClr val="000000"/>
+                </a:solidFill>
+                <a:effectLst/>
+                <a:latin typeface="Courier New" panose="02070309020205020404" pitchFamily="49" charset="0"/>
+                <a:cs typeface="Courier New" panose="02070309020205020404" pitchFamily="49" charset="0"/>
+              </a:rPr>
+              <a:t>    });</a:t>
+            </a:r>
+            <a:br>
+              <a:rPr kumimoji="0" lang="de-DE" altLang="de-DE" sz="2000" b="0" i="0" u="none" strike="noStrike" cap="none" normalizeH="0" baseline="0" dirty="0" smtClean="0">
+                <a:ln>
+                  <a:noFill/>
+                </a:ln>
+                <a:solidFill>
+                  <a:srgbClr val="000000"/>
+                </a:solidFill>
+                <a:effectLst/>
+                <a:latin typeface="Courier New" panose="02070309020205020404" pitchFamily="49" charset="0"/>
+                <a:cs typeface="Courier New" panose="02070309020205020404" pitchFamily="49" charset="0"/>
+              </a:rPr>
+            </a:br>
+            <a:r>
+              <a:rPr kumimoji="0" lang="de-DE" altLang="de-DE" sz="2000" b="0" i="0" u="none" strike="noStrike" cap="none" normalizeH="0" baseline="0" dirty="0" smtClean="0">
+                <a:ln>
+                  <a:noFill/>
+                </a:ln>
+                <a:solidFill>
+                  <a:srgbClr val="000000"/>
+                </a:solidFill>
+                <a:effectLst/>
+                <a:latin typeface="Courier New" panose="02070309020205020404" pitchFamily="49" charset="0"/>
+                <a:cs typeface="Courier New" panose="02070309020205020404" pitchFamily="49" charset="0"/>
+              </a:rPr>
+              <a:t>}</a:t>
+            </a:r>
+            <a:endParaRPr kumimoji="0" lang="de-DE" altLang="de-DE" sz="2000" b="0" i="0" u="none" strike="noStrike" cap="none" normalizeH="0" baseline="0" dirty="0" smtClean="0">
+              <a:ln>
+                <a:noFill/>
+              </a:ln>
+              <a:solidFill>
+                <a:schemeClr val="tx1"/>
+              </a:solidFill>
+              <a:effectLst/>
+              <a:latin typeface="Arial" panose="020B0604020202020204" pitchFamily="34" charset="0"/>
+            </a:endParaRPr>
+          </a:p>
+        </p:txBody>
+      </p:sp>
+    </p:spTree>
+    <p:extLst>
+      <p:ext uri="{BB962C8B-B14F-4D97-AF65-F5344CB8AC3E}">
+        <p14:creationId xmlns:p14="http://schemas.microsoft.com/office/powerpoint/2010/main" val="84474072"/>
+      </p:ext>
+    </p:extLst>
+  </p:cSld>
+  <p:clrMapOvr>
+    <a:masterClrMapping/>
+  </p:clrMapOvr>
+  <p:timing>
+    <p:tnLst>
+      <p:par>
+        <p:cTn id="1" dur="indefinite" restart="never" nodeType="tmRoot"/>
+      </p:par>
+    </p:tnLst>
+  </p:timing>
+</p:sld>
+</file>
+
+<file path=ppt/slides/slide14.xml><?xml version="1.0" encoding="utf-8"?>
+<p:sld xmlns:a="http://schemas.openxmlformats.org/drawingml/2006/main" xmlns:r="http://schemas.openxmlformats.org/officeDocument/2006/relationships" xmlns:p="http://schemas.openxmlformats.org/presentationml/2006/main">
+  <p:cSld>
+    <p:spTree>
+      <p:nvGrpSpPr>
+        <p:cNvPr id="1" name=""/>
+        <p:cNvGrpSpPr/>
+        <p:nvPr/>
+      </p:nvGrpSpPr>
+      <p:grpSpPr>
+        <a:xfrm>
+          <a:off x="0" y="0"/>
+          <a:ext cx="0" cy="0"/>
+          <a:chOff x="0" y="0"/>
+          <a:chExt cx="0" cy="0"/>
+        </a:xfrm>
+      </p:grpSpPr>
+      <p:sp>
+        <p:nvSpPr>
+          <p:cNvPr id="2" name="Datumsplatzhalter 1"/>
+          <p:cNvSpPr>
+            <a:spLocks noGrp="1"/>
+          </p:cNvSpPr>
+          <p:nvPr>
+            <p:ph type="dt" sz="half" idx="10"/>
+          </p:nvPr>
+        </p:nvSpPr>
+        <p:spPr/>
+        <p:txBody>
+          <a:bodyPr/>
+          <a:lstStyle/>
+          <a:p>
+            <a:fld id="{5E48492E-72D1-4785-9351-8AE1E40FBA2D}" type="datetime1">
+              <a:rPr lang="de-CH" smtClean="0">
+                <a:solidFill>
+                  <a:srgbClr val="000000"/>
+                </a:solidFill>
+              </a:rPr>
+              <a:t>14.06.2016</a:t>
+            </a:fld>
+            <a:endParaRPr lang="de-CH">
+              <a:solidFill>
+                <a:srgbClr val="000000"/>
+              </a:solidFill>
+            </a:endParaRPr>
+          </a:p>
+        </p:txBody>
+      </p:sp>
+      <p:sp>
+        <p:nvSpPr>
+          <p:cNvPr id="3" name="Fußzeilenplatzhalter 2"/>
+          <p:cNvSpPr>
+            <a:spLocks noGrp="1"/>
+          </p:cNvSpPr>
+          <p:nvPr>
+            <p:ph type="ftr" sz="quarter" idx="11"/>
+          </p:nvPr>
+        </p:nvSpPr>
+        <p:spPr/>
+        <p:txBody>
+          <a:bodyPr/>
+          <a:lstStyle/>
+          <a:p>
+            <a:endParaRPr lang="de-CH" dirty="0">
+              <a:solidFill>
+                <a:srgbClr val="000000"/>
+              </a:solidFill>
+            </a:endParaRPr>
+          </a:p>
+        </p:txBody>
+      </p:sp>
+      <p:sp>
+        <p:nvSpPr>
+          <p:cNvPr id="4" name="Foliennummernplatzhalter 3"/>
+          <p:cNvSpPr>
+            <a:spLocks noGrp="1"/>
+          </p:cNvSpPr>
+          <p:nvPr>
+            <p:ph type="sldNum" sz="quarter" idx="12"/>
+          </p:nvPr>
+        </p:nvSpPr>
+        <p:spPr/>
+        <p:txBody>
+          <a:bodyPr/>
+          <a:lstStyle/>
+          <a:p>
+            <a:fld id="{351188DD-6605-4EF4-9E67-B567F731CE68}" type="slidenum">
+              <a:rPr lang="de-CH" smtClean="0">
+                <a:solidFill>
+                  <a:srgbClr val="000000"/>
+                </a:solidFill>
+              </a:rPr>
+              <a:pPr/>
+              <a:t>14</a:t>
+            </a:fld>
+            <a:endParaRPr lang="de-CH">
+              <a:solidFill>
+                <a:srgbClr val="000000"/>
+              </a:solidFill>
+            </a:endParaRPr>
+          </a:p>
+        </p:txBody>
+      </p:sp>
+      <p:sp>
+        <p:nvSpPr>
+          <p:cNvPr id="5" name="Titel 4"/>
+          <p:cNvSpPr>
+            <a:spLocks noGrp="1"/>
+          </p:cNvSpPr>
+          <p:nvPr>
+            <p:ph type="title"/>
+          </p:nvPr>
+        </p:nvSpPr>
+        <p:spPr/>
+        <p:txBody>
+          <a:bodyPr/>
+          <a:lstStyle/>
+          <a:p>
+            <a:r>
+              <a:rPr lang="de-CH" dirty="0"/>
+              <a:t>Simple </a:t>
+            </a:r>
+            <a:r>
+              <a:rPr lang="de-CH" dirty="0" err="1"/>
+              <a:t>concurrent</a:t>
+            </a:r>
+            <a:r>
+              <a:rPr lang="de-CH" dirty="0"/>
+              <a:t> </a:t>
+            </a:r>
+            <a:r>
+              <a:rPr lang="de-CH" dirty="0" err="1" smtClean="0"/>
+              <a:t>programming</a:t>
+            </a:r>
+            <a:endParaRPr lang="de-CH" dirty="0"/>
+          </a:p>
+        </p:txBody>
+      </p:sp>
+      <p:sp>
+        <p:nvSpPr>
+          <p:cNvPr id="6" name="Textplatzhalter 5"/>
+          <p:cNvSpPr>
+            <a:spLocks noGrp="1"/>
+          </p:cNvSpPr>
+          <p:nvPr>
+            <p:ph type="body" idx="1"/>
+          </p:nvPr>
+        </p:nvSpPr>
+        <p:spPr/>
+        <p:txBody>
+          <a:bodyPr/>
+          <a:lstStyle/>
+          <a:p>
+            <a:pPr marL="342900" indent="-342900">
+              <a:buFont typeface="Arial" panose="020B0604020202020204" pitchFamily="34" charset="0"/>
+              <a:buChar char="•"/>
+            </a:pPr>
+            <a:r>
+              <a:rPr lang="de-CH" dirty="0" smtClean="0"/>
+              <a:t>IO sollte nicht auch Main-Thread laufen</a:t>
+            </a:r>
+          </a:p>
+          <a:p>
+            <a:pPr marL="342900" indent="-342900">
+              <a:buFont typeface="Arial" panose="020B0604020202020204" pitchFamily="34" charset="0"/>
+              <a:buChar char="•"/>
+            </a:pPr>
+            <a:r>
+              <a:rPr lang="de-CH" dirty="0" err="1"/>
+              <a:t>CompletableFuture</a:t>
+            </a:r>
+            <a:r>
+              <a:rPr lang="de-CH" dirty="0"/>
+              <a:t> seit Java 8</a:t>
+            </a:r>
+          </a:p>
+          <a:p>
+            <a:pPr marL="342900" indent="-342900">
+              <a:buFont typeface="Arial" panose="020B0604020202020204" pitchFamily="34" charset="0"/>
+              <a:buChar char="•"/>
+            </a:pPr>
+            <a:r>
+              <a:rPr lang="de-CH" dirty="0" smtClean="0"/>
+              <a:t>Änderungen müssen wieder auf Main-Thread laufen</a:t>
+            </a:r>
+            <a:endParaRPr lang="de-CH" dirty="0"/>
+          </a:p>
+        </p:txBody>
+      </p:sp>
+      <p:sp>
+        <p:nvSpPr>
+          <p:cNvPr id="9" name="Rectangle 2"/>
+          <p:cNvSpPr>
+            <a:spLocks noChangeArrowheads="1"/>
+          </p:cNvSpPr>
+          <p:nvPr/>
+        </p:nvSpPr>
+        <p:spPr bwMode="auto">
+          <a:xfrm>
+            <a:off x="747012" y="3924647"/>
+            <a:ext cx="9203438" cy="1938992"/>
+          </a:xfrm>
+          <a:prstGeom prst="rect">
+            <a:avLst/>
+          </a:prstGeom>
+          <a:ln/>
+        </p:spPr>
+        <p:style>
+          <a:lnRef idx="2">
+            <a:schemeClr val="dk1"/>
+          </a:lnRef>
+          <a:fillRef idx="1">
+            <a:schemeClr val="lt1"/>
+          </a:fillRef>
+          <a:effectRef idx="0">
+            <a:schemeClr val="dk1"/>
+          </a:effectRef>
+          <a:fontRef idx="minor">
+            <a:schemeClr val="dk1"/>
+          </a:fontRef>
+        </p:style>
+        <p:txBody>
+          <a:bodyPr vert="horz" wrap="square" lIns="91440" tIns="45720" rIns="91440" bIns="45720" numCol="1" anchor="ctr" anchorCtr="0" compatLnSpc="1">
+            <a:prstTxWarp prst="textNoShape">
+              <a:avLst/>
+            </a:prstTxWarp>
+            <a:spAutoFit/>
+          </a:bodyPr>
+          <a:lstStyle/>
+          <a:p>
+            <a:pPr marL="0" marR="0" lvl="0" indent="0" algn="l" defTabSz="914400" rtl="0" eaLnBrk="0" fontAlgn="base" latinLnBrk="0" hangingPunct="0">
+              <a:lnSpc>
+                <a:spcPct val="100000"/>
+              </a:lnSpc>
+              <a:spcBef>
+                <a:spcPct val="0"/>
+              </a:spcBef>
+              <a:spcAft>
+                <a:spcPct val="0"/>
+              </a:spcAft>
+              <a:buClrTx/>
+              <a:buSzTx/>
+              <a:buFontTx/>
+              <a:buNone/>
+              <a:tabLst/>
+            </a:pPr>
+            <a:r>
+              <a:rPr kumimoji="0" lang="de-DE" altLang="de-DE" sz="2000" b="1" i="0" u="none" strike="noStrike" cap="none" normalizeH="0" baseline="0" dirty="0" err="1" smtClean="0">
+                <a:ln>
+                  <a:noFill/>
+                </a:ln>
+                <a:solidFill>
+                  <a:srgbClr val="660E7A"/>
+                </a:solidFill>
+                <a:effectLst/>
+                <a:latin typeface="Courier New" panose="02070309020205020404" pitchFamily="49" charset="0"/>
+                <a:cs typeface="Courier New" panose="02070309020205020404" pitchFamily="49" charset="0"/>
+              </a:rPr>
+              <a:t>movieService</a:t>
+            </a:r>
+            <a:r>
+              <a:rPr kumimoji="0" lang="de-DE" altLang="de-DE" sz="2000" b="1" i="0" u="none" strike="noStrike" cap="none" normalizeH="0" baseline="0" dirty="0" smtClean="0">
+                <a:ln>
+                  <a:noFill/>
+                </a:ln>
+                <a:solidFill>
+                  <a:srgbClr val="660E7A"/>
+                </a:solidFill>
+                <a:effectLst/>
+                <a:latin typeface="Courier New" panose="02070309020205020404" pitchFamily="49" charset="0"/>
+                <a:cs typeface="Courier New" panose="02070309020205020404" pitchFamily="49" charset="0"/>
+              </a:rPr>
+              <a:t/>
+            </a:r>
+            <a:br>
+              <a:rPr kumimoji="0" lang="de-DE" altLang="de-DE" sz="2000" b="1" i="0" u="none" strike="noStrike" cap="none" normalizeH="0" baseline="0" dirty="0" smtClean="0">
+                <a:ln>
+                  <a:noFill/>
+                </a:ln>
+                <a:solidFill>
+                  <a:srgbClr val="660E7A"/>
+                </a:solidFill>
+                <a:effectLst/>
+                <a:latin typeface="Courier New" panose="02070309020205020404" pitchFamily="49" charset="0"/>
+                <a:cs typeface="Courier New" panose="02070309020205020404" pitchFamily="49" charset="0"/>
+              </a:rPr>
+            </a:br>
+            <a:r>
+              <a:rPr kumimoji="0" lang="de-DE" altLang="de-DE" sz="2000" b="1" i="0" u="none" strike="noStrike" cap="none" normalizeH="0" baseline="0" dirty="0" smtClean="0">
+                <a:ln>
+                  <a:noFill/>
+                </a:ln>
+                <a:solidFill>
+                  <a:srgbClr val="660E7A"/>
+                </a:solidFill>
+                <a:effectLst/>
+                <a:latin typeface="Courier New" panose="02070309020205020404" pitchFamily="49" charset="0"/>
+                <a:cs typeface="Courier New" panose="02070309020205020404" pitchFamily="49" charset="0"/>
+              </a:rPr>
+              <a:t>        </a:t>
+            </a:r>
+            <a:r>
+              <a:rPr kumimoji="0" lang="de-DE" altLang="de-DE" sz="2000" b="0" i="0" u="none" strike="noStrike" cap="none" normalizeH="0" baseline="0" dirty="0" smtClean="0">
+                <a:ln>
+                  <a:noFill/>
+                </a:ln>
+                <a:solidFill>
+                  <a:srgbClr val="000000"/>
+                </a:solidFill>
+                <a:effectLst/>
+                <a:latin typeface="Courier New" panose="02070309020205020404" pitchFamily="49" charset="0"/>
+                <a:cs typeface="Courier New" panose="02070309020205020404" pitchFamily="49" charset="0"/>
+              </a:rPr>
+              <a:t>.</a:t>
+            </a:r>
+            <a:r>
+              <a:rPr kumimoji="0" lang="de-DE" altLang="de-DE" sz="2000" b="0" i="0" u="none" strike="noStrike" cap="none" normalizeH="0" baseline="0" dirty="0" err="1" smtClean="0">
+                <a:ln>
+                  <a:noFill/>
+                </a:ln>
+                <a:solidFill>
+                  <a:srgbClr val="000000"/>
+                </a:solidFill>
+                <a:effectLst/>
+                <a:latin typeface="Courier New" panose="02070309020205020404" pitchFamily="49" charset="0"/>
+                <a:cs typeface="Courier New" panose="02070309020205020404" pitchFamily="49" charset="0"/>
+              </a:rPr>
+              <a:t>getAllMovies</a:t>
+            </a:r>
+            <a:r>
+              <a:rPr kumimoji="0" lang="de-DE" altLang="de-DE" sz="2000" b="0" i="0" u="none" strike="noStrike" cap="none" normalizeH="0" baseline="0" dirty="0" smtClean="0">
+                <a:ln>
+                  <a:noFill/>
+                </a:ln>
+                <a:solidFill>
+                  <a:srgbClr val="000000"/>
+                </a:solidFill>
+                <a:effectLst/>
+                <a:latin typeface="Courier New" panose="02070309020205020404" pitchFamily="49" charset="0"/>
+                <a:cs typeface="Courier New" panose="02070309020205020404" pitchFamily="49" charset="0"/>
+              </a:rPr>
+              <a:t>()</a:t>
+            </a:r>
+            <a:br>
+              <a:rPr kumimoji="0" lang="de-DE" altLang="de-DE" sz="2000" b="0" i="0" u="none" strike="noStrike" cap="none" normalizeH="0" baseline="0" dirty="0" smtClean="0">
+                <a:ln>
+                  <a:noFill/>
+                </a:ln>
+                <a:solidFill>
+                  <a:srgbClr val="000000"/>
+                </a:solidFill>
+                <a:effectLst/>
+                <a:latin typeface="Courier New" panose="02070309020205020404" pitchFamily="49" charset="0"/>
+                <a:cs typeface="Courier New" panose="02070309020205020404" pitchFamily="49" charset="0"/>
+              </a:rPr>
+            </a:br>
+            <a:r>
+              <a:rPr kumimoji="0" lang="de-DE" altLang="de-DE" sz="2000" b="0" i="0" u="none" strike="noStrike" cap="none" normalizeH="0" baseline="0" dirty="0" smtClean="0">
+                <a:ln>
+                  <a:noFill/>
+                </a:ln>
+                <a:solidFill>
+                  <a:srgbClr val="000000"/>
+                </a:solidFill>
+                <a:effectLst/>
+                <a:latin typeface="Courier New" panose="02070309020205020404" pitchFamily="49" charset="0"/>
+                <a:cs typeface="Courier New" panose="02070309020205020404" pitchFamily="49" charset="0"/>
+              </a:rPr>
+              <a:t>        .</a:t>
+            </a:r>
+            <a:r>
+              <a:rPr kumimoji="0" lang="de-DE" altLang="de-DE" sz="2000" b="0" i="0" u="none" strike="noStrike" cap="none" normalizeH="0" baseline="0" dirty="0" err="1" smtClean="0">
+                <a:ln>
+                  <a:noFill/>
+                </a:ln>
+                <a:solidFill>
+                  <a:srgbClr val="000000"/>
+                </a:solidFill>
+                <a:effectLst/>
+                <a:latin typeface="Courier New" panose="02070309020205020404" pitchFamily="49" charset="0"/>
+                <a:cs typeface="Courier New" panose="02070309020205020404" pitchFamily="49" charset="0"/>
+              </a:rPr>
+              <a:t>whenComplete</a:t>
+            </a:r>
+            <a:r>
+              <a:rPr kumimoji="0" lang="de-DE" altLang="de-DE" sz="2000" b="0" i="0" u="none" strike="noStrike" cap="none" normalizeH="0" baseline="0" dirty="0" smtClean="0">
+                <a:ln>
+                  <a:noFill/>
+                </a:ln>
+                <a:solidFill>
+                  <a:srgbClr val="000000"/>
+                </a:solidFill>
+                <a:effectLst/>
+                <a:latin typeface="Courier New" panose="02070309020205020404" pitchFamily="49" charset="0"/>
+                <a:cs typeface="Courier New" panose="02070309020205020404" pitchFamily="49" charset="0"/>
+              </a:rPr>
+              <a:t>((</a:t>
+            </a:r>
+            <a:r>
+              <a:rPr kumimoji="0" lang="de-DE" altLang="de-DE" sz="2000" b="0" i="0" u="none" strike="noStrike" cap="none" normalizeH="0" baseline="0" dirty="0" err="1" smtClean="0">
+                <a:ln>
+                  <a:noFill/>
+                </a:ln>
+                <a:solidFill>
+                  <a:srgbClr val="000000"/>
+                </a:solidFill>
+                <a:effectLst/>
+                <a:latin typeface="Courier New" panose="02070309020205020404" pitchFamily="49" charset="0"/>
+                <a:cs typeface="Courier New" panose="02070309020205020404" pitchFamily="49" charset="0"/>
+              </a:rPr>
+              <a:t>movies</a:t>
+            </a:r>
+            <a:r>
+              <a:rPr kumimoji="0" lang="de-DE" altLang="de-DE" sz="2000" b="0" i="0" u="none" strike="noStrike" cap="none" normalizeH="0" baseline="0" dirty="0" smtClean="0">
+                <a:ln>
+                  <a:noFill/>
+                </a:ln>
+                <a:solidFill>
+                  <a:srgbClr val="000000"/>
+                </a:solidFill>
+                <a:effectLst/>
+                <a:latin typeface="Courier New" panose="02070309020205020404" pitchFamily="49" charset="0"/>
+                <a:cs typeface="Courier New" panose="02070309020205020404" pitchFamily="49" charset="0"/>
+              </a:rPr>
+              <a:t>, </a:t>
+            </a:r>
+            <a:r>
+              <a:rPr kumimoji="0" lang="de-DE" altLang="de-DE" sz="2000" b="0" i="0" u="none" strike="noStrike" cap="none" normalizeH="0" baseline="0" dirty="0" err="1" smtClean="0">
+                <a:ln>
+                  <a:noFill/>
+                </a:ln>
+                <a:solidFill>
+                  <a:srgbClr val="000000"/>
+                </a:solidFill>
+                <a:effectLst/>
+                <a:latin typeface="Courier New" panose="02070309020205020404" pitchFamily="49" charset="0"/>
+                <a:cs typeface="Courier New" panose="02070309020205020404" pitchFamily="49" charset="0"/>
+              </a:rPr>
+              <a:t>throwable</a:t>
+            </a:r>
+            <a:r>
+              <a:rPr kumimoji="0" lang="de-DE" altLang="de-DE" sz="2000" b="0" i="0" u="none" strike="noStrike" cap="none" normalizeH="0" baseline="0" dirty="0" smtClean="0">
+                <a:ln>
+                  <a:noFill/>
+                </a:ln>
+                <a:solidFill>
+                  <a:srgbClr val="000000"/>
+                </a:solidFill>
+                <a:effectLst/>
+                <a:latin typeface="Courier New" panose="02070309020205020404" pitchFamily="49" charset="0"/>
+                <a:cs typeface="Courier New" panose="02070309020205020404" pitchFamily="49" charset="0"/>
+              </a:rPr>
+              <a:t>) -&gt; </a:t>
+            </a:r>
+            <a:r>
+              <a:rPr kumimoji="0" lang="de-DE" altLang="de-DE" sz="2000" b="0" i="0" u="none" strike="noStrike" cap="none" normalizeH="0" baseline="0" dirty="0" err="1" smtClean="0">
+                <a:ln>
+                  <a:noFill/>
+                </a:ln>
+                <a:solidFill>
+                  <a:srgbClr val="000000"/>
+                </a:solidFill>
+                <a:effectLst/>
+                <a:latin typeface="Courier New" panose="02070309020205020404" pitchFamily="49" charset="0"/>
+                <a:cs typeface="Courier New" panose="02070309020205020404" pitchFamily="49" charset="0"/>
+              </a:rPr>
+              <a:t>Platform.</a:t>
+            </a:r>
+            <a:r>
+              <a:rPr kumimoji="0" lang="de-DE" altLang="de-DE" sz="2000" b="0" i="1" u="none" strike="noStrike" cap="none" normalizeH="0" baseline="0" dirty="0" err="1" smtClean="0">
+                <a:ln>
+                  <a:noFill/>
+                </a:ln>
+                <a:solidFill>
+                  <a:srgbClr val="000000"/>
+                </a:solidFill>
+                <a:effectLst/>
+                <a:latin typeface="Courier New" panose="02070309020205020404" pitchFamily="49" charset="0"/>
+                <a:cs typeface="Courier New" panose="02070309020205020404" pitchFamily="49" charset="0"/>
+              </a:rPr>
+              <a:t>runLater</a:t>
+            </a:r>
+            <a:r>
+              <a:rPr kumimoji="0" lang="de-DE" altLang="de-DE" sz="2000" b="0" i="0" u="none" strike="noStrike" cap="none" normalizeH="0" baseline="0" dirty="0" smtClean="0">
+                <a:ln>
+                  <a:noFill/>
+                </a:ln>
+                <a:solidFill>
+                  <a:srgbClr val="000000"/>
+                </a:solidFill>
+                <a:effectLst/>
+                <a:latin typeface="Courier New" panose="02070309020205020404" pitchFamily="49" charset="0"/>
+                <a:cs typeface="Courier New" panose="02070309020205020404" pitchFamily="49" charset="0"/>
+              </a:rPr>
+              <a:t>(() -&gt; {</a:t>
+            </a:r>
+            <a:br>
+              <a:rPr kumimoji="0" lang="de-DE" altLang="de-DE" sz="2000" b="0" i="0" u="none" strike="noStrike" cap="none" normalizeH="0" baseline="0" dirty="0" smtClean="0">
+                <a:ln>
+                  <a:noFill/>
+                </a:ln>
+                <a:solidFill>
+                  <a:srgbClr val="000000"/>
+                </a:solidFill>
+                <a:effectLst/>
+                <a:latin typeface="Courier New" panose="02070309020205020404" pitchFamily="49" charset="0"/>
+                <a:cs typeface="Courier New" panose="02070309020205020404" pitchFamily="49" charset="0"/>
+              </a:rPr>
+            </a:br>
+            <a:r>
+              <a:rPr kumimoji="0" lang="de-DE" altLang="de-DE" sz="2000" b="0" i="0" u="none" strike="noStrike" cap="none" normalizeH="0" baseline="0" dirty="0" smtClean="0">
+                <a:ln>
+                  <a:noFill/>
+                </a:ln>
+                <a:solidFill>
+                  <a:srgbClr val="000000"/>
+                </a:solidFill>
+                <a:effectLst/>
+                <a:latin typeface="Courier New" panose="02070309020205020404" pitchFamily="49" charset="0"/>
+                <a:cs typeface="Courier New" panose="02070309020205020404" pitchFamily="49" charset="0"/>
+              </a:rPr>
+              <a:t>              </a:t>
+            </a:r>
+            <a:r>
+              <a:rPr kumimoji="0" lang="de-DE" altLang="de-DE" sz="2000" b="1" i="0" u="none" strike="noStrike" cap="none" normalizeH="0" baseline="0" dirty="0" err="1" smtClean="0">
+                <a:ln>
+                  <a:noFill/>
+                </a:ln>
+                <a:solidFill>
+                  <a:srgbClr val="660E7A"/>
+                </a:solidFill>
+                <a:effectLst/>
+                <a:latin typeface="Courier New" panose="02070309020205020404" pitchFamily="49" charset="0"/>
+                <a:cs typeface="Courier New" panose="02070309020205020404" pitchFamily="49" charset="0"/>
+              </a:rPr>
+              <a:t>data</a:t>
+            </a:r>
+            <a:r>
+              <a:rPr kumimoji="0" lang="de-DE" altLang="de-DE" sz="2000" b="0" i="0" u="none" strike="noStrike" cap="none" normalizeH="0" baseline="0" dirty="0" err="1" smtClean="0">
+                <a:ln>
+                  <a:noFill/>
+                </a:ln>
+                <a:solidFill>
+                  <a:srgbClr val="000000"/>
+                </a:solidFill>
+                <a:effectLst/>
+                <a:latin typeface="Courier New" panose="02070309020205020404" pitchFamily="49" charset="0"/>
+                <a:cs typeface="Courier New" panose="02070309020205020404" pitchFamily="49" charset="0"/>
+              </a:rPr>
+              <a:t>.addAll</a:t>
+            </a:r>
+            <a:r>
+              <a:rPr kumimoji="0" lang="de-DE" altLang="de-DE" sz="2000" b="0" i="0" u="none" strike="noStrike" cap="none" normalizeH="0" baseline="0" dirty="0" smtClean="0">
+                <a:ln>
+                  <a:noFill/>
+                </a:ln>
+                <a:solidFill>
+                  <a:srgbClr val="000000"/>
+                </a:solidFill>
+                <a:effectLst/>
+                <a:latin typeface="Courier New" panose="02070309020205020404" pitchFamily="49" charset="0"/>
+                <a:cs typeface="Courier New" panose="02070309020205020404" pitchFamily="49" charset="0"/>
+              </a:rPr>
+              <a:t>(</a:t>
+            </a:r>
+            <a:r>
+              <a:rPr kumimoji="0" lang="de-DE" altLang="de-DE" sz="2000" b="0" i="0" u="none" strike="noStrike" cap="none" normalizeH="0" baseline="0" dirty="0" err="1" smtClean="0">
+                <a:ln>
+                  <a:noFill/>
+                </a:ln>
+                <a:solidFill>
+                  <a:srgbClr val="000000"/>
+                </a:solidFill>
+                <a:effectLst/>
+                <a:latin typeface="Courier New" panose="02070309020205020404" pitchFamily="49" charset="0"/>
+                <a:cs typeface="Courier New" panose="02070309020205020404" pitchFamily="49" charset="0"/>
+              </a:rPr>
+              <a:t>movies</a:t>
+            </a:r>
+            <a:r>
+              <a:rPr kumimoji="0" lang="de-DE" altLang="de-DE" sz="2000" b="0" i="0" u="none" strike="noStrike" cap="none" normalizeH="0" baseline="0" dirty="0" smtClean="0">
+                <a:ln>
+                  <a:noFill/>
+                </a:ln>
+                <a:solidFill>
+                  <a:srgbClr val="000000"/>
+                </a:solidFill>
+                <a:effectLst/>
+                <a:latin typeface="Courier New" panose="02070309020205020404" pitchFamily="49" charset="0"/>
+                <a:cs typeface="Courier New" panose="02070309020205020404" pitchFamily="49" charset="0"/>
+              </a:rPr>
+              <a:t>);</a:t>
+            </a:r>
+            <a:br>
+              <a:rPr kumimoji="0" lang="de-DE" altLang="de-DE" sz="2000" b="0" i="0" u="none" strike="noStrike" cap="none" normalizeH="0" baseline="0" dirty="0" smtClean="0">
+                <a:ln>
+                  <a:noFill/>
+                </a:ln>
+                <a:solidFill>
+                  <a:srgbClr val="000000"/>
+                </a:solidFill>
+                <a:effectLst/>
+                <a:latin typeface="Courier New" panose="02070309020205020404" pitchFamily="49" charset="0"/>
+                <a:cs typeface="Courier New" panose="02070309020205020404" pitchFamily="49" charset="0"/>
+              </a:rPr>
+            </a:br>
+            <a:r>
+              <a:rPr kumimoji="0" lang="de-DE" altLang="de-DE" sz="2000" b="0" i="0" u="none" strike="noStrike" cap="none" normalizeH="0" baseline="0" dirty="0" smtClean="0">
+                <a:ln>
+                  <a:noFill/>
+                </a:ln>
+                <a:solidFill>
+                  <a:srgbClr val="000000"/>
+                </a:solidFill>
+                <a:effectLst/>
+                <a:latin typeface="Courier New" panose="02070309020205020404" pitchFamily="49" charset="0"/>
+                <a:cs typeface="Courier New" panose="02070309020205020404" pitchFamily="49" charset="0"/>
+              </a:rPr>
+              <a:t>        }));</a:t>
+            </a:r>
+            <a:endParaRPr kumimoji="0" lang="de-DE" altLang="de-DE" sz="2000" b="0" i="0" u="none" strike="noStrike" cap="none" normalizeH="0" baseline="0" dirty="0" smtClean="0">
+              <a:ln>
+                <a:noFill/>
+              </a:ln>
+              <a:solidFill>
+                <a:schemeClr val="tx1"/>
+              </a:solidFill>
+              <a:effectLst/>
+              <a:latin typeface="Arial" panose="020B0604020202020204" pitchFamily="34" charset="0"/>
+            </a:endParaRPr>
+          </a:p>
+        </p:txBody>
+      </p:sp>
+    </p:spTree>
+    <p:extLst>
+      <p:ext uri="{BB962C8B-B14F-4D97-AF65-F5344CB8AC3E}">
+        <p14:creationId xmlns:p14="http://schemas.microsoft.com/office/powerpoint/2010/main" val="1317462183"/>
+      </p:ext>
+    </p:extLst>
+  </p:cSld>
+  <p:clrMapOvr>
+    <a:masterClrMapping/>
+  </p:clrMapOvr>
+  <p:timing>
+    <p:tnLst>
+      <p:par>
+        <p:cTn id="1" dur="indefinite" restart="never" nodeType="tmRoot"/>
+      </p:par>
+    </p:tnLst>
+  </p:timing>
+</p:sld>
+</file>
+
+<file path=ppt/slides/slide15.xml><?xml version="1.0" encoding="utf-8"?>
+<p:sld xmlns:a="http://schemas.openxmlformats.org/drawingml/2006/main" xmlns:r="http://schemas.openxmlformats.org/officeDocument/2006/relationships" xmlns:p="http://schemas.openxmlformats.org/presentationml/2006/main">
+  <p:cSld>
+    <p:spTree>
+      <p:nvGrpSpPr>
+        <p:cNvPr id="1" name=""/>
+        <p:cNvGrpSpPr/>
+        <p:nvPr/>
+      </p:nvGrpSpPr>
+      <p:grpSpPr>
+        <a:xfrm>
+          <a:off x="0" y="0"/>
+          <a:ext cx="0" cy="0"/>
+          <a:chOff x="0" y="0"/>
+          <a:chExt cx="0" cy="0"/>
+        </a:xfrm>
+      </p:grpSpPr>
+      <p:sp>
+        <p:nvSpPr>
+          <p:cNvPr id="2" name="Datumsplatzhalter 1"/>
+          <p:cNvSpPr>
+            <a:spLocks noGrp="1"/>
+          </p:cNvSpPr>
+          <p:nvPr>
+            <p:ph type="dt" sz="half" idx="10"/>
+          </p:nvPr>
+        </p:nvSpPr>
+        <p:spPr/>
+        <p:txBody>
+          <a:bodyPr/>
+          <a:lstStyle/>
+          <a:p>
+            <a:fld id="{5E48492E-72D1-4785-9351-8AE1E40FBA2D}" type="datetime1">
+              <a:rPr lang="de-CH" smtClean="0">
+                <a:solidFill>
+                  <a:srgbClr val="000000"/>
+                </a:solidFill>
+              </a:rPr>
+              <a:t>14.06.2016</a:t>
+            </a:fld>
+            <a:endParaRPr lang="de-CH">
+              <a:solidFill>
+                <a:srgbClr val="000000"/>
+              </a:solidFill>
+            </a:endParaRPr>
+          </a:p>
+        </p:txBody>
+      </p:sp>
+      <p:sp>
+        <p:nvSpPr>
+          <p:cNvPr id="3" name="Fußzeilenplatzhalter 2"/>
+          <p:cNvSpPr>
+            <a:spLocks noGrp="1"/>
+          </p:cNvSpPr>
+          <p:nvPr>
+            <p:ph type="ftr" sz="quarter" idx="11"/>
+          </p:nvPr>
+        </p:nvSpPr>
+        <p:spPr/>
+        <p:txBody>
+          <a:bodyPr/>
+          <a:lstStyle/>
+          <a:p>
+            <a:endParaRPr lang="de-CH" dirty="0">
+              <a:solidFill>
+                <a:srgbClr val="000000"/>
+              </a:solidFill>
+            </a:endParaRPr>
+          </a:p>
+        </p:txBody>
+      </p:sp>
+      <p:sp>
+        <p:nvSpPr>
+          <p:cNvPr id="4" name="Foliennummernplatzhalter 3"/>
+          <p:cNvSpPr>
+            <a:spLocks noGrp="1"/>
+          </p:cNvSpPr>
+          <p:nvPr>
+            <p:ph type="sldNum" sz="quarter" idx="12"/>
+          </p:nvPr>
+        </p:nvSpPr>
+        <p:spPr/>
+        <p:txBody>
+          <a:bodyPr/>
+          <a:lstStyle/>
+          <a:p>
+            <a:fld id="{351188DD-6605-4EF4-9E67-B567F731CE68}" type="slidenum">
+              <a:rPr lang="de-CH" smtClean="0">
+                <a:solidFill>
+                  <a:srgbClr val="000000"/>
+                </a:solidFill>
+              </a:rPr>
+              <a:pPr/>
+              <a:t>15</a:t>
             </a:fld>
             <a:endParaRPr lang="de-CH">
               <a:solidFill>
@@ -6414,7 +7955,7 @@
           <p:nvPr/>
         </p:nvPicPr>
         <p:blipFill>
-          <a:blip r:embed="rId2">
+          <a:blip r:embed="rId3">
             <a:extLst>
               <a:ext uri="{28A0092B-C50C-407E-A947-70E740481C1C}">
                 <a14:useLocalDpi xmlns:a14="http://schemas.microsoft.com/office/drawing/2010/main" val="0"/>
@@ -7221,7 +8762,7 @@
                   <a:srgbClr val="000000"/>
                 </a:solidFill>
               </a:rPr>
-              <a:t>29.05.2016</a:t>
+              <a:t>14.06.2016</a:t>
             </a:fld>
             <a:endParaRPr lang="de-CH">
               <a:solidFill>
@@ -7364,12 +8905,30 @@
               <a:t>Build</a:t>
             </a:r>
             <a:r>
+              <a:rPr lang="de-DE" dirty="0" smtClean="0"/>
+              <a:t>-Prozess</a:t>
+            </a:r>
+          </a:p>
+          <a:p>
+            <a:pPr marL="342900" indent="-342900">
+              <a:buFont typeface="Arial" panose="020B0604020202020204" pitchFamily="34" charset="0"/>
+              <a:buChar char="•"/>
+            </a:pPr>
+            <a:r>
               <a:rPr lang="de-DE" dirty="0"/>
-              <a:t>-</a:t>
-            </a:r>
-            <a:r>
-              <a:rPr lang="de-DE" dirty="0" smtClean="0"/>
-              <a:t>Prozess</a:t>
+              <a:t>Simple </a:t>
+            </a:r>
+            <a:r>
+              <a:rPr lang="de-DE" dirty="0" err="1"/>
+              <a:t>concurrent</a:t>
+            </a:r>
+            <a:r>
+              <a:rPr lang="de-DE" dirty="0"/>
+              <a:t> </a:t>
+            </a:r>
+            <a:r>
+              <a:rPr lang="de-DE" dirty="0" err="1"/>
+              <a:t>programming</a:t>
             </a:r>
             <a:endParaRPr lang="de-DE" dirty="0"/>
           </a:p>
@@ -7433,7 +8992,7 @@
                   <a:srgbClr val="000000"/>
                 </a:solidFill>
               </a:rPr>
-              <a:t>29.05.2016</a:t>
+              <a:t>14.06.2016</a:t>
             </a:fld>
             <a:endParaRPr lang="de-CH">
               <a:solidFill>
@@ -7609,7 +9168,7 @@
                   <a:srgbClr val="000000"/>
                 </a:solidFill>
               </a:rPr>
-              <a:t>29.05.2016</a:t>
+              <a:t>14.06.2016</a:t>
             </a:fld>
             <a:endParaRPr lang="de-CH">
               <a:solidFill>
@@ -7726,53 +9285,13 @@
             </a:r>
             <a:r>
               <a:rPr lang="de-CH" dirty="0" smtClean="0"/>
-              <a:t> XAML</a:t>
-            </a:r>
-          </a:p>
-          <a:p>
-            <a:pPr marL="342900" indent="-342900">
-              <a:buFont typeface="Arial" panose="020B0604020202020204" pitchFamily="34" charset="0"/>
-              <a:buChar char="•"/>
-            </a:pPr>
+              <a:t> </a:t>
+            </a:r>
             <a:r>
               <a:rPr lang="de-CH" dirty="0" smtClean="0"/>
-              <a:t>Scene </a:t>
-            </a:r>
-            <a:r>
-              <a:rPr lang="de-CH" dirty="0" err="1" smtClean="0"/>
-              <a:t>Builder</a:t>
-            </a:r>
-            <a:r>
-              <a:rPr lang="de-CH" dirty="0"/>
-              <a:t> (WYSIWYG</a:t>
-            </a:r>
-            <a:r>
-              <a:rPr lang="de-CH" dirty="0" smtClean="0"/>
-              <a:t>)</a:t>
-            </a:r>
-          </a:p>
-          <a:p>
-            <a:pPr marL="342900" indent="-342900">
-              <a:buFont typeface="Arial" panose="020B0604020202020204" pitchFamily="34" charset="0"/>
-              <a:buChar char="•"/>
-            </a:pPr>
-            <a:r>
-              <a:rPr lang="de-CH" dirty="0" err="1" smtClean="0"/>
-              <a:t>Prototyping</a:t>
-            </a:r>
-            <a:r>
-              <a:rPr lang="de-CH" dirty="0" smtClean="0"/>
-              <a:t> ohne </a:t>
-            </a:r>
-            <a:r>
-              <a:rPr lang="de-CH" dirty="0"/>
-              <a:t>K</a:t>
-            </a:r>
-            <a:r>
-              <a:rPr lang="de-CH" dirty="0" smtClean="0"/>
-              <a:t>ompilierung</a:t>
-            </a:r>
-            <a:endParaRPr lang="de-CH" dirty="0"/>
+              <a:t>XAML</a:t>
+            </a:r>
+            <a:endParaRPr lang="de-CH" dirty="0" smtClean="0"/>
           </a:p>
         </p:txBody>
       </p:sp>
@@ -7786,8 +9305,8 @@
         </p:nvSpPr>
         <p:spPr bwMode="auto">
           <a:xfrm>
-            <a:off x="1026220" y="3770285"/>
-            <a:ext cx="8856984" cy="2893100"/>
+            <a:off x="736600" y="2876466"/>
+            <a:ext cx="9146604" cy="3693319"/>
           </a:xfrm>
           <a:prstGeom prst="rect">
             <a:avLst/>
@@ -7835,7 +9354,7 @@
               <a:tabLst/>
             </a:pPr>
             <a:r>
-              <a:rPr kumimoji="0" lang="de-DE" altLang="de-DE" sz="1400" b="0" i="1" u="none" strike="noStrike" cap="none" normalizeH="0" baseline="0" dirty="0" smtClean="0">
+              <a:rPr kumimoji="0" lang="de-DE" altLang="de-DE" sz="1800" b="0" i="1" u="none" strike="noStrike" cap="none" normalizeH="0" baseline="0" dirty="0" smtClean="0">
                 <a:ln>
                   <a:noFill/>
                 </a:ln>
@@ -7849,7 +9368,7 @@
               <a:t>&lt;?</a:t>
             </a:r>
             <a:r>
-              <a:rPr kumimoji="0" lang="de-DE" altLang="de-DE" sz="1400" b="1" i="0" u="none" strike="noStrike" cap="none" normalizeH="0" baseline="0" dirty="0" err="1" smtClean="0">
+              <a:rPr kumimoji="0" lang="de-DE" altLang="de-DE" sz="1800" b="1" i="0" u="none" strike="noStrike" cap="none" normalizeH="0" baseline="0" dirty="0" err="1" smtClean="0">
                 <a:ln>
                   <a:noFill/>
                 </a:ln>
@@ -7863,7 +9382,7 @@
               <a:t>import</a:t>
             </a:r>
             <a:r>
-              <a:rPr kumimoji="0" lang="de-DE" altLang="de-DE" sz="1400" b="1" i="0" u="none" strike="noStrike" cap="none" normalizeH="0" baseline="0" dirty="0" smtClean="0">
+              <a:rPr kumimoji="0" lang="de-DE" altLang="de-DE" sz="1800" b="1" i="0" u="none" strike="noStrike" cap="none" normalizeH="0" baseline="0" dirty="0" smtClean="0">
                 <a:ln>
                   <a:noFill/>
                 </a:ln>
@@ -7877,7 +9396,7 @@
               <a:t> </a:t>
             </a:r>
             <a:r>
-              <a:rPr kumimoji="0" lang="de-DE" altLang="de-DE" sz="1400" b="1" i="0" u="none" strike="noStrike" cap="none" normalizeH="0" baseline="0" dirty="0" err="1" smtClean="0">
+              <a:rPr kumimoji="0" lang="de-DE" altLang="de-DE" sz="1800" b="1" i="0" u="none" strike="noStrike" cap="none" normalizeH="0" baseline="0" dirty="0" err="1" smtClean="0">
                 <a:ln>
                   <a:noFill/>
                 </a:ln>
@@ -7891,7 +9410,7 @@
               <a:t>javafx.scene.control.SplitPane</a:t>
             </a:r>
             <a:r>
-              <a:rPr kumimoji="0" lang="de-DE" altLang="de-DE" sz="1400" b="0" i="1" u="none" strike="noStrike" cap="none" normalizeH="0" baseline="0" dirty="0" smtClean="0">
+              <a:rPr kumimoji="0" lang="de-DE" altLang="de-DE" sz="1800" b="0" i="1" u="none" strike="noStrike" cap="none" normalizeH="0" baseline="0" dirty="0" smtClean="0">
                 <a:ln>
                   <a:noFill/>
                 </a:ln>
@@ -7905,7 +9424,7 @@
               <a:t>?&gt;</a:t>
             </a:r>
             <a:br>
-              <a:rPr kumimoji="0" lang="de-DE" altLang="de-DE" sz="1400" b="0" i="1" u="none" strike="noStrike" cap="none" normalizeH="0" baseline="0" dirty="0" smtClean="0">
+              <a:rPr kumimoji="0" lang="de-DE" altLang="de-DE" sz="1800" b="0" i="1" u="none" strike="noStrike" cap="none" normalizeH="0" baseline="0" dirty="0" smtClean="0">
                 <a:ln>
                   <a:noFill/>
                 </a:ln>
@@ -7918,7 +9437,7 @@
               </a:rPr>
             </a:br>
             <a:r>
-              <a:rPr kumimoji="0" lang="de-DE" altLang="de-DE" sz="1400" b="0" i="1" u="none" strike="noStrike" cap="none" normalizeH="0" baseline="0" dirty="0" smtClean="0">
+              <a:rPr kumimoji="0" lang="de-DE" altLang="de-DE" sz="1800" b="0" i="1" u="none" strike="noStrike" cap="none" normalizeH="0" baseline="0" dirty="0" smtClean="0">
                 <a:ln>
                   <a:noFill/>
                 </a:ln>
@@ -7932,7 +9451,7 @@
               <a:t>&lt;?</a:t>
             </a:r>
             <a:r>
-              <a:rPr kumimoji="0" lang="de-DE" altLang="de-DE" sz="1400" b="1" i="0" u="none" strike="noStrike" cap="none" normalizeH="0" baseline="0" dirty="0" err="1" smtClean="0">
+              <a:rPr kumimoji="0" lang="de-DE" altLang="de-DE" sz="1800" b="1" i="0" u="none" strike="noStrike" cap="none" normalizeH="0" baseline="0" dirty="0" err="1" smtClean="0">
                 <a:ln>
                   <a:noFill/>
                 </a:ln>
@@ -7946,7 +9465,7 @@
               <a:t>import</a:t>
             </a:r>
             <a:r>
-              <a:rPr kumimoji="0" lang="de-DE" altLang="de-DE" sz="1400" b="1" i="0" u="none" strike="noStrike" cap="none" normalizeH="0" baseline="0" dirty="0" smtClean="0">
+              <a:rPr kumimoji="0" lang="de-DE" altLang="de-DE" sz="1800" b="1" i="0" u="none" strike="noStrike" cap="none" normalizeH="0" baseline="0" dirty="0" smtClean="0">
                 <a:ln>
                   <a:noFill/>
                 </a:ln>
@@ -7960,7 +9479,7 @@
               <a:t> </a:t>
             </a:r>
             <a:r>
-              <a:rPr kumimoji="0" lang="de-DE" altLang="de-DE" sz="1400" b="1" i="0" u="none" strike="noStrike" cap="none" normalizeH="0" baseline="0" dirty="0" err="1" smtClean="0">
+              <a:rPr kumimoji="0" lang="de-DE" altLang="de-DE" sz="1800" b="1" i="0" u="none" strike="noStrike" cap="none" normalizeH="0" baseline="0" dirty="0" err="1" smtClean="0">
                 <a:ln>
                   <a:noFill/>
                 </a:ln>
@@ -7974,7 +9493,7 @@
               <a:t>javafx.scene.layout.AnchorPane</a:t>
             </a:r>
             <a:r>
-              <a:rPr kumimoji="0" lang="de-DE" altLang="de-DE" sz="1400" b="0" i="1" u="none" strike="noStrike" cap="none" normalizeH="0" baseline="0" dirty="0" smtClean="0">
+              <a:rPr kumimoji="0" lang="de-DE" altLang="de-DE" sz="1800" b="0" i="1" u="none" strike="noStrike" cap="none" normalizeH="0" baseline="0" dirty="0" smtClean="0">
                 <a:ln>
                   <a:noFill/>
                 </a:ln>
@@ -7988,7 +9507,7 @@
               <a:t>?&gt;</a:t>
             </a:r>
             <a:br>
-              <a:rPr kumimoji="0" lang="de-DE" altLang="de-DE" sz="1400" b="0" i="1" u="none" strike="noStrike" cap="none" normalizeH="0" baseline="0" dirty="0" smtClean="0">
+              <a:rPr kumimoji="0" lang="de-DE" altLang="de-DE" sz="1800" b="0" i="1" u="none" strike="noStrike" cap="none" normalizeH="0" baseline="0" dirty="0" smtClean="0">
                 <a:ln>
                   <a:noFill/>
                 </a:ln>
@@ -8001,7 +9520,7 @@
               </a:rPr>
             </a:br>
             <a:r>
-              <a:rPr kumimoji="0" lang="de-DE" altLang="de-DE" sz="1400" b="0" i="1" u="none" strike="noStrike" cap="none" normalizeH="0" baseline="0" dirty="0" smtClean="0">
+              <a:rPr kumimoji="0" lang="de-DE" altLang="de-DE" sz="1800" b="0" i="1" u="none" strike="noStrike" cap="none" normalizeH="0" baseline="0" dirty="0" smtClean="0">
                 <a:ln>
                   <a:noFill/>
                 </a:ln>
@@ -8015,7 +9534,7 @@
               <a:t>&lt;?</a:t>
             </a:r>
             <a:r>
-              <a:rPr kumimoji="0" lang="de-DE" altLang="de-DE" sz="1400" b="1" i="0" u="none" strike="noStrike" cap="none" normalizeH="0" baseline="0" dirty="0" err="1" smtClean="0">
+              <a:rPr kumimoji="0" lang="de-DE" altLang="de-DE" sz="1800" b="1" i="0" u="none" strike="noStrike" cap="none" normalizeH="0" baseline="0" dirty="0" err="1" smtClean="0">
                 <a:ln>
                   <a:noFill/>
                 </a:ln>
@@ -8029,7 +9548,7 @@
               <a:t>import</a:t>
             </a:r>
             <a:r>
-              <a:rPr kumimoji="0" lang="de-DE" altLang="de-DE" sz="1400" b="1" i="0" u="none" strike="noStrike" cap="none" normalizeH="0" baseline="0" dirty="0" smtClean="0">
+              <a:rPr kumimoji="0" lang="de-DE" altLang="de-DE" sz="1800" b="1" i="0" u="none" strike="noStrike" cap="none" normalizeH="0" baseline="0" dirty="0" smtClean="0">
                 <a:ln>
                   <a:noFill/>
                 </a:ln>
@@ -8043,7 +9562,7 @@
               <a:t> </a:t>
             </a:r>
             <a:r>
-              <a:rPr kumimoji="0" lang="de-DE" altLang="de-DE" sz="1400" b="1" i="0" u="none" strike="noStrike" cap="none" normalizeH="0" baseline="0" dirty="0" err="1" smtClean="0">
+              <a:rPr kumimoji="0" lang="de-DE" altLang="de-DE" sz="1800" b="1" i="0" u="none" strike="noStrike" cap="none" normalizeH="0" baseline="0" dirty="0" err="1" smtClean="0">
                 <a:ln>
                   <a:noFill/>
                 </a:ln>
@@ -8057,7 +9576,7 @@
               <a:t>javafx.scene.layout.BorderPane</a:t>
             </a:r>
             <a:r>
-              <a:rPr kumimoji="0" lang="de-DE" altLang="de-DE" sz="1400" b="0" i="1" u="none" strike="noStrike" cap="none" normalizeH="0" baseline="0" dirty="0" smtClean="0">
+              <a:rPr kumimoji="0" lang="de-DE" altLang="de-DE" sz="1800" b="0" i="1" u="none" strike="noStrike" cap="none" normalizeH="0" baseline="0" dirty="0" smtClean="0">
                 <a:ln>
                   <a:noFill/>
                 </a:ln>
@@ -8071,7 +9590,7 @@
               <a:t>?&gt;</a:t>
             </a:r>
             <a:br>
-              <a:rPr kumimoji="0" lang="de-DE" altLang="de-DE" sz="1400" b="0" i="1" u="none" strike="noStrike" cap="none" normalizeH="0" baseline="0" dirty="0" smtClean="0">
+              <a:rPr kumimoji="0" lang="de-DE" altLang="de-DE" sz="1800" b="0" i="1" u="none" strike="noStrike" cap="none" normalizeH="0" baseline="0" dirty="0" smtClean="0">
                 <a:ln>
                   <a:noFill/>
                 </a:ln>
@@ -8084,7 +9603,7 @@
               </a:rPr>
             </a:br>
             <a:r>
-              <a:rPr kumimoji="0" lang="de-DE" altLang="de-DE" sz="1400" b="0" i="1" u="none" strike="noStrike" cap="none" normalizeH="0" baseline="0" dirty="0" smtClean="0">
+              <a:rPr kumimoji="0" lang="de-DE" altLang="de-DE" sz="1800" b="0" i="1" u="none" strike="noStrike" cap="none" normalizeH="0" baseline="0" dirty="0" smtClean="0">
                 <a:ln>
                   <a:noFill/>
                 </a:ln>
@@ -8098,7 +9617,7 @@
               <a:t/>
             </a:r>
             <a:br>
-              <a:rPr kumimoji="0" lang="de-DE" altLang="de-DE" sz="1400" b="0" i="1" u="none" strike="noStrike" cap="none" normalizeH="0" baseline="0" dirty="0" smtClean="0">
+              <a:rPr kumimoji="0" lang="de-DE" altLang="de-DE" sz="1800" b="0" i="1" u="none" strike="noStrike" cap="none" normalizeH="0" baseline="0" dirty="0" smtClean="0">
                 <a:ln>
                   <a:noFill/>
                 </a:ln>
@@ -8111,7 +9630,7 @@
               </a:rPr>
             </a:br>
             <a:r>
-              <a:rPr kumimoji="0" lang="de-DE" altLang="de-DE" sz="1400" b="0" i="0" u="none" strike="noStrike" cap="none" normalizeH="0" baseline="0" dirty="0" smtClean="0">
+              <a:rPr kumimoji="0" lang="de-DE" altLang="de-DE" sz="1800" b="0" i="0" u="none" strike="noStrike" cap="none" normalizeH="0" baseline="0" dirty="0" smtClean="0">
                 <a:ln>
                   <a:noFill/>
                 </a:ln>
@@ -8125,7 +9644,7 @@
               <a:t>&lt;</a:t>
             </a:r>
             <a:r>
-              <a:rPr kumimoji="0" lang="de-DE" altLang="de-DE" sz="1400" b="1" i="0" u="none" strike="noStrike" cap="none" normalizeH="0" baseline="0" dirty="0" err="1" smtClean="0">
+              <a:rPr kumimoji="0" lang="de-DE" altLang="de-DE" sz="1800" b="1" i="0" u="none" strike="noStrike" cap="none" normalizeH="0" baseline="0" dirty="0" err="1" smtClean="0">
                 <a:ln>
                   <a:noFill/>
                 </a:ln>
@@ -8139,7 +9658,7 @@
               <a:t>AnchorPane</a:t>
             </a:r>
             <a:r>
-              <a:rPr kumimoji="0" lang="de-DE" altLang="de-DE" sz="1400" b="1" i="0" u="none" strike="noStrike" cap="none" normalizeH="0" baseline="0" dirty="0" smtClean="0">
+              <a:rPr kumimoji="0" lang="de-DE" altLang="de-DE" sz="1800" b="1" i="0" u="none" strike="noStrike" cap="none" normalizeH="0" baseline="0" dirty="0" smtClean="0">
                 <a:ln>
                   <a:noFill/>
                 </a:ln>
@@ -8153,7 +9672,7 @@
               <a:t> </a:t>
             </a:r>
             <a:r>
-              <a:rPr kumimoji="0" lang="de-DE" altLang="de-DE" sz="1400" b="1" i="0" u="none" strike="noStrike" cap="none" normalizeH="0" baseline="0" dirty="0" err="1" smtClean="0">
+              <a:rPr kumimoji="0" lang="de-DE" altLang="de-DE" sz="1800" b="1" i="0" u="none" strike="noStrike" cap="none" normalizeH="0" baseline="0" dirty="0" err="1" smtClean="0">
                 <a:ln>
                   <a:noFill/>
                 </a:ln>
@@ -8167,7 +9686,7 @@
               <a:t>fx:controller</a:t>
             </a:r>
             <a:r>
-              <a:rPr kumimoji="0" lang="de-DE" altLang="de-DE" sz="1400" b="1" i="0" u="none" strike="noStrike" cap="none" normalizeH="0" baseline="0" dirty="0" smtClean="0">
+              <a:rPr kumimoji="0" lang="de-DE" altLang="de-DE" sz="1800" b="1" i="0" u="none" strike="noStrike" cap="none" normalizeH="0" baseline="0" dirty="0" smtClean="0">
                 <a:ln>
                   <a:noFill/>
                 </a:ln>
@@ -8181,7 +9700,7 @@
               <a:t>=".</a:t>
             </a:r>
             <a:r>
-              <a:rPr kumimoji="0" lang="de-DE" altLang="de-DE" sz="1400" b="1" i="0" u="none" strike="noStrike" cap="none" normalizeH="0" baseline="0" dirty="0" err="1" smtClean="0">
+              <a:rPr kumimoji="0" lang="de-DE" altLang="de-DE" sz="1800" b="1" i="0" u="none" strike="noStrike" cap="none" normalizeH="0" baseline="0" dirty="0" err="1" smtClean="0">
                 <a:ln>
                   <a:noFill/>
                 </a:ln>
@@ -8195,7 +9714,7 @@
               <a:t>DashboardPresenter</a:t>
             </a:r>
             <a:r>
-              <a:rPr kumimoji="0" lang="de-DE" altLang="de-DE" sz="1400" b="1" i="0" u="none" strike="noStrike" cap="none" normalizeH="0" baseline="0" dirty="0" smtClean="0">
+              <a:rPr kumimoji="0" lang="de-DE" altLang="de-DE" sz="1800" b="1" i="0" u="none" strike="noStrike" cap="none" normalizeH="0" baseline="0" dirty="0" smtClean="0">
                 <a:ln>
                   <a:noFill/>
                 </a:ln>
@@ -8209,7 +9728,7 @@
               <a:t>„ ...</a:t>
             </a:r>
             <a:r>
-              <a:rPr kumimoji="0" lang="de-DE" altLang="de-DE" sz="1400" b="0" i="0" u="none" strike="noStrike" cap="none" normalizeH="0" baseline="0" dirty="0" smtClean="0">
+              <a:rPr kumimoji="0" lang="de-DE" altLang="de-DE" sz="1800" b="0" i="0" u="none" strike="noStrike" cap="none" normalizeH="0" baseline="0" dirty="0" smtClean="0">
                 <a:ln>
                   <a:noFill/>
                 </a:ln>
@@ -8223,7 +9742,7 @@
               <a:t>&gt;</a:t>
             </a:r>
             <a:br>
-              <a:rPr kumimoji="0" lang="de-DE" altLang="de-DE" sz="1400" b="0" i="0" u="none" strike="noStrike" cap="none" normalizeH="0" baseline="0" dirty="0" smtClean="0">
+              <a:rPr kumimoji="0" lang="de-DE" altLang="de-DE" sz="1800" b="0" i="0" u="none" strike="noStrike" cap="none" normalizeH="0" baseline="0" dirty="0" smtClean="0">
                 <a:ln>
                   <a:noFill/>
                 </a:ln>
@@ -8236,7 +9755,7 @@
               </a:rPr>
             </a:br>
             <a:r>
-              <a:rPr kumimoji="0" lang="de-DE" altLang="de-DE" sz="1400" b="0" i="0" u="none" strike="noStrike" cap="none" normalizeH="0" baseline="0" dirty="0" smtClean="0">
+              <a:rPr kumimoji="0" lang="de-DE" altLang="de-DE" sz="1800" b="0" i="0" u="none" strike="noStrike" cap="none" normalizeH="0" baseline="0" dirty="0" smtClean="0">
                 <a:ln>
                   <a:noFill/>
                 </a:ln>
@@ -8250,7 +9769,7 @@
               <a:t>   &lt;</a:t>
             </a:r>
             <a:r>
-              <a:rPr kumimoji="0" lang="de-DE" altLang="de-DE" sz="1400" b="1" i="0" u="none" strike="noStrike" cap="none" normalizeH="0" baseline="0" dirty="0" err="1" smtClean="0">
+              <a:rPr kumimoji="0" lang="de-DE" altLang="de-DE" sz="1800" b="1" i="0" u="none" strike="noStrike" cap="none" normalizeH="0" baseline="0" dirty="0" err="1" smtClean="0">
                 <a:ln>
                   <a:noFill/>
                 </a:ln>
@@ -8264,7 +9783,7 @@
               <a:t>children</a:t>
             </a:r>
             <a:r>
-              <a:rPr kumimoji="0" lang="de-DE" altLang="de-DE" sz="1400" b="0" i="0" u="none" strike="noStrike" cap="none" normalizeH="0" baseline="0" dirty="0" smtClean="0">
+              <a:rPr kumimoji="0" lang="de-DE" altLang="de-DE" sz="1800" b="0" i="0" u="none" strike="noStrike" cap="none" normalizeH="0" baseline="0" dirty="0" smtClean="0">
                 <a:ln>
                   <a:noFill/>
                 </a:ln>
@@ -8278,7 +9797,7 @@
               <a:t>&gt;</a:t>
             </a:r>
             <a:br>
-              <a:rPr kumimoji="0" lang="de-DE" altLang="de-DE" sz="1400" b="0" i="0" u="none" strike="noStrike" cap="none" normalizeH="0" baseline="0" dirty="0" smtClean="0">
+              <a:rPr kumimoji="0" lang="de-DE" altLang="de-DE" sz="1800" b="0" i="0" u="none" strike="noStrike" cap="none" normalizeH="0" baseline="0" dirty="0" smtClean="0">
                 <a:ln>
                   <a:noFill/>
                 </a:ln>
@@ -8291,7 +9810,7 @@
               </a:rPr>
             </a:br>
             <a:r>
-              <a:rPr kumimoji="0" lang="de-DE" altLang="de-DE" sz="1400" b="0" i="0" u="none" strike="noStrike" cap="none" normalizeH="0" baseline="0" dirty="0" smtClean="0">
+              <a:rPr kumimoji="0" lang="de-DE" altLang="de-DE" sz="1800" b="0" i="0" u="none" strike="noStrike" cap="none" normalizeH="0" baseline="0" dirty="0" smtClean="0">
                 <a:ln>
                   <a:noFill/>
                 </a:ln>
@@ -8305,7 +9824,7 @@
               <a:t>      &lt;</a:t>
             </a:r>
             <a:r>
-              <a:rPr kumimoji="0" lang="de-DE" altLang="de-DE" sz="1400" b="1" i="0" u="none" strike="noStrike" cap="none" normalizeH="0" baseline="0" dirty="0" err="1" smtClean="0">
+              <a:rPr kumimoji="0" lang="de-DE" altLang="de-DE" sz="1800" b="1" i="0" u="none" strike="noStrike" cap="none" normalizeH="0" baseline="0" dirty="0" err="1" smtClean="0">
                 <a:ln>
                   <a:noFill/>
                 </a:ln>
@@ -8319,7 +9838,7 @@
               <a:t>BorderPane</a:t>
             </a:r>
             <a:r>
-              <a:rPr kumimoji="0" lang="de-DE" altLang="de-DE" sz="1400" b="1" i="0" u="none" strike="noStrike" cap="none" normalizeH="0" baseline="0" dirty="0" smtClean="0">
+              <a:rPr kumimoji="0" lang="de-DE" altLang="de-DE" sz="1800" b="1" i="0" u="none" strike="noStrike" cap="none" normalizeH="0" baseline="0" dirty="0" smtClean="0">
                 <a:ln>
                   <a:noFill/>
                 </a:ln>
@@ -8333,7 +9852,7 @@
               <a:t> </a:t>
             </a:r>
             <a:r>
-              <a:rPr kumimoji="0" lang="de-DE" altLang="de-DE" sz="1400" b="1" i="0" u="none" strike="noStrike" cap="none" normalizeH="0" baseline="0" dirty="0" err="1" smtClean="0">
+              <a:rPr kumimoji="0" lang="de-DE" altLang="de-DE" sz="1800" b="1" i="0" u="none" strike="noStrike" cap="none" normalizeH="0" baseline="0" dirty="0" err="1" smtClean="0">
                 <a:ln>
                   <a:noFill/>
                 </a:ln>
@@ -8347,7 +9866,7 @@
               <a:t>fx:id</a:t>
             </a:r>
             <a:r>
-              <a:rPr kumimoji="0" lang="de-DE" altLang="de-DE" sz="1400" b="1" i="0" u="none" strike="noStrike" cap="none" normalizeH="0" baseline="0" dirty="0" smtClean="0">
+              <a:rPr kumimoji="0" lang="de-DE" altLang="de-DE" sz="1800" b="1" i="0" u="none" strike="noStrike" cap="none" normalizeH="0" baseline="0" dirty="0" smtClean="0">
                 <a:ln>
                   <a:noFill/>
                 </a:ln>
@@ -8361,7 +9880,7 @@
               <a:t>="</a:t>
             </a:r>
             <a:r>
-              <a:rPr kumimoji="0" lang="de-DE" altLang="de-DE" sz="1400" b="1" i="0" u="none" strike="noStrike" cap="none" normalizeH="0" baseline="0" dirty="0" err="1" smtClean="0">
+              <a:rPr kumimoji="0" lang="de-DE" altLang="de-DE" sz="1800" b="1" i="0" u="none" strike="noStrike" cap="none" normalizeH="0" baseline="0" dirty="0" err="1" smtClean="0">
                 <a:ln>
                   <a:noFill/>
                 </a:ln>
@@ -8375,7 +9894,7 @@
               <a:t>borderPane</a:t>
             </a:r>
             <a:r>
-              <a:rPr kumimoji="0" lang="de-DE" altLang="de-DE" sz="1400" b="1" i="0" u="none" strike="noStrike" cap="none" normalizeH="0" baseline="0" dirty="0" smtClean="0">
+              <a:rPr kumimoji="0" lang="de-DE" altLang="de-DE" sz="1800" b="1" i="0" u="none" strike="noStrike" cap="none" normalizeH="0" baseline="0" dirty="0" smtClean="0">
                 <a:ln>
                   <a:noFill/>
                 </a:ln>
@@ -8389,7 +9908,7 @@
               <a:t>" </a:t>
             </a:r>
             <a:r>
-              <a:rPr kumimoji="0" lang="de-DE" altLang="de-DE" sz="1400" b="1" i="0" u="none" strike="noStrike" cap="none" normalizeH="0" baseline="0" dirty="0" err="1" smtClean="0">
+              <a:rPr kumimoji="0" lang="de-DE" altLang="de-DE" sz="1800" b="1" i="0" u="none" strike="noStrike" cap="none" normalizeH="0" baseline="0" dirty="0" err="1" smtClean="0">
                 <a:ln>
                   <a:noFill/>
                 </a:ln>
@@ -8403,7 +9922,7 @@
               <a:t>prefHeight</a:t>
             </a:r>
             <a:r>
-              <a:rPr kumimoji="0" lang="de-DE" altLang="de-DE" sz="1400" b="1" i="0" u="none" strike="noStrike" cap="none" normalizeH="0" baseline="0" dirty="0" smtClean="0">
+              <a:rPr kumimoji="0" lang="de-DE" altLang="de-DE" sz="1800" b="1" i="0" u="none" strike="noStrike" cap="none" normalizeH="0" baseline="0" dirty="0" smtClean="0">
                 <a:ln>
                   <a:noFill/>
                 </a:ln>
@@ -8417,7 +9936,7 @@
               <a:t>="200.0" </a:t>
             </a:r>
             <a:r>
-              <a:rPr kumimoji="0" lang="de-DE" altLang="de-DE" sz="1400" b="1" i="0" u="none" strike="noStrike" cap="none" normalizeH="0" baseline="0" dirty="0" smtClean="0">
+              <a:rPr kumimoji="0" lang="de-DE" altLang="de-DE" sz="1800" b="1" i="0" u="none" strike="noStrike" cap="none" normalizeH="0" baseline="0" dirty="0" smtClean="0">
                 <a:ln>
                   <a:noFill/>
                 </a:ln>
@@ -8431,7 +9950,7 @@
               <a:t>...&gt;</a:t>
             </a:r>
             <a:r>
-              <a:rPr kumimoji="0" lang="de-DE" altLang="de-DE" sz="1400" b="0" i="0" u="none" strike="noStrike" cap="none" normalizeH="0" baseline="0" dirty="0" smtClean="0">
+              <a:rPr kumimoji="0" lang="de-DE" altLang="de-DE" sz="1800" b="0" i="0" u="none" strike="noStrike" cap="none" normalizeH="0" baseline="0" dirty="0" smtClean="0">
                 <a:ln>
                   <a:noFill/>
                 </a:ln>
@@ -8445,7 +9964,7 @@
               <a:t/>
             </a:r>
             <a:br>
-              <a:rPr kumimoji="0" lang="de-DE" altLang="de-DE" sz="1400" b="0" i="0" u="none" strike="noStrike" cap="none" normalizeH="0" baseline="0" dirty="0" smtClean="0">
+              <a:rPr kumimoji="0" lang="de-DE" altLang="de-DE" sz="1800" b="0" i="0" u="none" strike="noStrike" cap="none" normalizeH="0" baseline="0" dirty="0" smtClean="0">
                 <a:ln>
                   <a:noFill/>
                 </a:ln>
@@ -8458,7 +9977,7 @@
               </a:rPr>
             </a:br>
             <a:r>
-              <a:rPr kumimoji="0" lang="de-DE" altLang="de-DE" sz="1400" b="0" i="0" u="none" strike="noStrike" cap="none" normalizeH="0" baseline="0" dirty="0" smtClean="0">
+              <a:rPr kumimoji="0" lang="de-DE" altLang="de-DE" sz="1800" b="0" i="0" u="none" strike="noStrike" cap="none" normalizeH="0" baseline="0" dirty="0" smtClean="0">
                 <a:ln>
                   <a:noFill/>
                 </a:ln>
@@ -8472,7 +9991,7 @@
               <a:t>         &lt;</a:t>
             </a:r>
             <a:r>
-              <a:rPr kumimoji="0" lang="de-DE" altLang="de-DE" sz="1400" b="1" i="0" u="none" strike="noStrike" cap="none" normalizeH="0" baseline="0" dirty="0" err="1" smtClean="0">
+              <a:rPr kumimoji="0" lang="de-DE" altLang="de-DE" sz="1800" b="1" i="0" u="none" strike="noStrike" cap="none" normalizeH="0" baseline="0" dirty="0" err="1" smtClean="0">
                 <a:ln>
                   <a:noFill/>
                 </a:ln>
@@ -8486,7 +10005,7 @@
               <a:t>center</a:t>
             </a:r>
             <a:r>
-              <a:rPr kumimoji="0" lang="de-DE" altLang="de-DE" sz="1400" b="0" i="0" u="none" strike="noStrike" cap="none" normalizeH="0" baseline="0" dirty="0" smtClean="0">
+              <a:rPr kumimoji="0" lang="de-DE" altLang="de-DE" sz="1800" b="0" i="0" u="none" strike="noStrike" cap="none" normalizeH="0" baseline="0" dirty="0" smtClean="0">
                 <a:ln>
                   <a:noFill/>
                 </a:ln>
@@ -8500,7 +10019,7 @@
               <a:t>&gt;</a:t>
             </a:r>
             <a:br>
-              <a:rPr kumimoji="0" lang="de-DE" altLang="de-DE" sz="1400" b="0" i="0" u="none" strike="noStrike" cap="none" normalizeH="0" baseline="0" dirty="0" smtClean="0">
+              <a:rPr kumimoji="0" lang="de-DE" altLang="de-DE" sz="1800" b="0" i="0" u="none" strike="noStrike" cap="none" normalizeH="0" baseline="0" dirty="0" smtClean="0">
                 <a:ln>
                   <a:noFill/>
                 </a:ln>
@@ -8513,7 +10032,7 @@
               </a:rPr>
             </a:br>
             <a:r>
-              <a:rPr kumimoji="0" lang="de-DE" altLang="de-DE" sz="1400" b="0" i="0" u="none" strike="noStrike" cap="none" normalizeH="0" baseline="0" dirty="0" smtClean="0">
+              <a:rPr kumimoji="0" lang="de-DE" altLang="de-DE" sz="1800" b="0" i="0" u="none" strike="noStrike" cap="none" normalizeH="0" baseline="0" dirty="0" smtClean="0">
                 <a:ln>
                   <a:noFill/>
                 </a:ln>
@@ -8527,7 +10046,7 @@
               <a:t>            &lt;</a:t>
             </a:r>
             <a:r>
-              <a:rPr kumimoji="0" lang="de-DE" altLang="de-DE" sz="1400" b="1" i="0" u="none" strike="noStrike" cap="none" normalizeH="0" baseline="0" dirty="0" err="1" smtClean="0">
+              <a:rPr kumimoji="0" lang="de-DE" altLang="de-DE" sz="1800" b="1" i="0" u="none" strike="noStrike" cap="none" normalizeH="0" baseline="0" dirty="0" err="1" smtClean="0">
                 <a:ln>
                   <a:noFill/>
                 </a:ln>
@@ -8541,7 +10060,7 @@
               <a:t>SplitPane</a:t>
             </a:r>
             <a:r>
-              <a:rPr kumimoji="0" lang="de-DE" altLang="de-DE" sz="1400" b="1" i="0" u="none" strike="noStrike" cap="none" normalizeH="0" baseline="0" dirty="0" smtClean="0">
+              <a:rPr kumimoji="0" lang="de-DE" altLang="de-DE" sz="1800" b="1" i="0" u="none" strike="noStrike" cap="none" normalizeH="0" baseline="0" dirty="0" smtClean="0">
                 <a:ln>
                   <a:noFill/>
                 </a:ln>
@@ -8555,7 +10074,7 @@
               <a:t> </a:t>
             </a:r>
             <a:r>
-              <a:rPr kumimoji="0" lang="de-DE" altLang="de-DE" sz="1400" b="1" i="0" u="none" strike="noStrike" cap="none" normalizeH="0" baseline="0" dirty="0" err="1" smtClean="0">
+              <a:rPr kumimoji="0" lang="de-DE" altLang="de-DE" sz="1800" b="1" i="0" u="none" strike="noStrike" cap="none" normalizeH="0" baseline="0" dirty="0" err="1" smtClean="0">
                 <a:ln>
                   <a:noFill/>
                 </a:ln>
@@ -8569,7 +10088,7 @@
               <a:t>fx</a:t>
             </a:r>
             <a:r>
-              <a:rPr kumimoji="0" lang="de-DE" altLang="de-DE" sz="1400" b="1" i="0" u="none" strike="noStrike" cap="none" normalizeH="0" baseline="0" dirty="0" err="1" smtClean="0">
+              <a:rPr kumimoji="0" lang="de-DE" altLang="de-DE" sz="1800" b="1" i="0" u="none" strike="noStrike" cap="none" normalizeH="0" baseline="0" dirty="0" err="1" smtClean="0">
                 <a:ln>
                   <a:noFill/>
                 </a:ln>
@@ -8583,7 +10102,7 @@
               <a:t>:id</a:t>
             </a:r>
             <a:r>
-              <a:rPr kumimoji="0" lang="de-DE" altLang="de-DE" sz="1400" b="1" i="0" u="none" strike="noStrike" cap="none" normalizeH="0" baseline="0" dirty="0" smtClean="0">
+              <a:rPr kumimoji="0" lang="de-DE" altLang="de-DE" sz="1800" b="1" i="0" u="none" strike="noStrike" cap="none" normalizeH="0" baseline="0" dirty="0" smtClean="0">
                 <a:ln>
                   <a:noFill/>
                 </a:ln>
@@ -8597,7 +10116,7 @@
               <a:t>="</a:t>
             </a:r>
             <a:r>
-              <a:rPr kumimoji="0" lang="de-DE" altLang="de-DE" sz="1400" b="1" i="0" u="none" strike="noStrike" cap="none" normalizeH="0" baseline="0" dirty="0" err="1" smtClean="0">
+              <a:rPr kumimoji="0" lang="de-DE" altLang="de-DE" sz="1800" b="1" i="0" u="none" strike="noStrike" cap="none" normalizeH="0" baseline="0" dirty="0" err="1" smtClean="0">
                 <a:ln>
                   <a:noFill/>
                 </a:ln>
@@ -8611,7 +10130,7 @@
               <a:t>splitPane</a:t>
             </a:r>
             <a:r>
-              <a:rPr kumimoji="0" lang="de-DE" altLang="de-DE" sz="1400" b="1" i="0" u="none" strike="noStrike" cap="none" normalizeH="0" baseline="0" dirty="0" smtClean="0">
+              <a:rPr kumimoji="0" lang="de-DE" altLang="de-DE" sz="1800" b="1" i="0" u="none" strike="noStrike" cap="none" normalizeH="0" baseline="0" dirty="0" smtClean="0">
                 <a:ln>
                   <a:noFill/>
                 </a:ln>
@@ -8625,7 +10144,7 @@
               <a:t>" </a:t>
             </a:r>
             <a:r>
-              <a:rPr kumimoji="0" lang="de-DE" altLang="de-DE" sz="1400" b="0" i="0" u="none" strike="noStrike" cap="none" normalizeH="0" baseline="0" dirty="0" smtClean="0">
+              <a:rPr kumimoji="0" lang="de-DE" altLang="de-DE" sz="1800" b="0" i="0" u="none" strike="noStrike" cap="none" normalizeH="0" baseline="0" dirty="0" smtClean="0">
                 <a:ln>
                   <a:noFill/>
                 </a:ln>
@@ -8639,7 +10158,7 @@
               <a:t>/&gt;</a:t>
             </a:r>
             <a:br>
-              <a:rPr kumimoji="0" lang="de-DE" altLang="de-DE" sz="1400" b="0" i="0" u="none" strike="noStrike" cap="none" normalizeH="0" baseline="0" dirty="0" smtClean="0">
+              <a:rPr kumimoji="0" lang="de-DE" altLang="de-DE" sz="1800" b="0" i="0" u="none" strike="noStrike" cap="none" normalizeH="0" baseline="0" dirty="0" smtClean="0">
                 <a:ln>
                   <a:noFill/>
                 </a:ln>
@@ -8652,7 +10171,7 @@
               </a:rPr>
             </a:br>
             <a:r>
-              <a:rPr kumimoji="0" lang="de-DE" altLang="de-DE" sz="1400" b="0" i="0" u="none" strike="noStrike" cap="none" normalizeH="0" baseline="0" dirty="0" smtClean="0">
+              <a:rPr kumimoji="0" lang="de-DE" altLang="de-DE" sz="1800" b="0" i="0" u="none" strike="noStrike" cap="none" normalizeH="0" baseline="0" dirty="0" smtClean="0">
                 <a:ln>
                   <a:noFill/>
                 </a:ln>
@@ -8666,7 +10185,7 @@
               <a:t>         &lt;/</a:t>
             </a:r>
             <a:r>
-              <a:rPr kumimoji="0" lang="de-DE" altLang="de-DE" sz="1400" b="1" i="0" u="none" strike="noStrike" cap="none" normalizeH="0" baseline="0" dirty="0" err="1" smtClean="0">
+              <a:rPr kumimoji="0" lang="de-DE" altLang="de-DE" sz="1800" b="1" i="0" u="none" strike="noStrike" cap="none" normalizeH="0" baseline="0" dirty="0" err="1" smtClean="0">
                 <a:ln>
                   <a:noFill/>
                 </a:ln>
@@ -8680,7 +10199,7 @@
               <a:t>center</a:t>
             </a:r>
             <a:r>
-              <a:rPr kumimoji="0" lang="de-DE" altLang="de-DE" sz="1400" b="0" i="0" u="none" strike="noStrike" cap="none" normalizeH="0" baseline="0" dirty="0" smtClean="0">
+              <a:rPr kumimoji="0" lang="de-DE" altLang="de-DE" sz="1800" b="0" i="0" u="none" strike="noStrike" cap="none" normalizeH="0" baseline="0" dirty="0" smtClean="0">
                 <a:ln>
                   <a:noFill/>
                 </a:ln>
@@ -8712,7 +10231,7 @@
               <a:tabLst/>
             </a:pPr>
             <a:r>
-              <a:rPr lang="de-DE" altLang="de-DE" sz="1400" dirty="0" smtClean="0">
+              <a:rPr lang="de-DE" altLang="de-DE" sz="1800" dirty="0" smtClean="0">
                 <a:solidFill>
                   <a:srgbClr val="000000"/>
                 </a:solidFill>
@@ -8722,7 +10241,7 @@
               <a:t>      </a:t>
             </a:r>
             <a:r>
-              <a:rPr kumimoji="0" lang="de-DE" altLang="de-DE" sz="1400" b="0" i="0" u="none" strike="noStrike" cap="none" normalizeH="0" baseline="0" dirty="0" smtClean="0">
+              <a:rPr kumimoji="0" lang="de-DE" altLang="de-DE" sz="1800" b="0" i="0" u="none" strike="noStrike" cap="none" normalizeH="0" baseline="0" dirty="0" smtClean="0">
                 <a:ln>
                   <a:noFill/>
                 </a:ln>
@@ -8736,7 +10255,7 @@
               <a:t>&lt;/</a:t>
             </a:r>
             <a:r>
-              <a:rPr kumimoji="0" lang="de-DE" altLang="de-DE" sz="1400" b="1" i="0" u="none" strike="noStrike" cap="none" normalizeH="0" baseline="0" dirty="0" err="1" smtClean="0">
+              <a:rPr kumimoji="0" lang="de-DE" altLang="de-DE" sz="1800" b="1" i="0" u="none" strike="noStrike" cap="none" normalizeH="0" baseline="0" dirty="0" err="1" smtClean="0">
                 <a:ln>
                   <a:noFill/>
                 </a:ln>
@@ -8750,7 +10269,7 @@
               <a:t>BorderPane</a:t>
             </a:r>
             <a:r>
-              <a:rPr kumimoji="0" lang="de-DE" altLang="de-DE" sz="1400" b="0" i="0" u="none" strike="noStrike" cap="none" normalizeH="0" baseline="0" dirty="0" smtClean="0">
+              <a:rPr kumimoji="0" lang="de-DE" altLang="de-DE" sz="1800" b="0" i="0" u="none" strike="noStrike" cap="none" normalizeH="0" baseline="0" dirty="0" smtClean="0">
                 <a:ln>
                   <a:noFill/>
                 </a:ln>
@@ -8764,7 +10283,7 @@
               <a:t>&gt;</a:t>
             </a:r>
             <a:br>
-              <a:rPr kumimoji="0" lang="de-DE" altLang="de-DE" sz="1400" b="0" i="0" u="none" strike="noStrike" cap="none" normalizeH="0" baseline="0" dirty="0" smtClean="0">
+              <a:rPr kumimoji="0" lang="de-DE" altLang="de-DE" sz="1800" b="0" i="0" u="none" strike="noStrike" cap="none" normalizeH="0" baseline="0" dirty="0" smtClean="0">
                 <a:ln>
                   <a:noFill/>
                 </a:ln>
@@ -8777,7 +10296,7 @@
               </a:rPr>
             </a:br>
             <a:r>
-              <a:rPr kumimoji="0" lang="de-DE" altLang="de-DE" sz="1400" b="0" i="0" u="none" strike="noStrike" cap="none" normalizeH="0" baseline="0" dirty="0" smtClean="0">
+              <a:rPr kumimoji="0" lang="de-DE" altLang="de-DE" sz="1800" b="0" i="0" u="none" strike="noStrike" cap="none" normalizeH="0" baseline="0" dirty="0" smtClean="0">
                 <a:ln>
                   <a:noFill/>
                 </a:ln>
@@ -8791,7 +10310,7 @@
               <a:t>   &lt;/</a:t>
             </a:r>
             <a:r>
-              <a:rPr kumimoji="0" lang="de-DE" altLang="de-DE" sz="1400" b="1" i="0" u="none" strike="noStrike" cap="none" normalizeH="0" baseline="0" dirty="0" err="1" smtClean="0">
+              <a:rPr kumimoji="0" lang="de-DE" altLang="de-DE" sz="1800" b="1" i="0" u="none" strike="noStrike" cap="none" normalizeH="0" baseline="0" dirty="0" err="1" smtClean="0">
                 <a:ln>
                   <a:noFill/>
                 </a:ln>
@@ -8805,7 +10324,7 @@
               <a:t>children</a:t>
             </a:r>
             <a:r>
-              <a:rPr kumimoji="0" lang="de-DE" altLang="de-DE" sz="1400" b="0" i="0" u="none" strike="noStrike" cap="none" normalizeH="0" baseline="0" dirty="0" smtClean="0">
+              <a:rPr kumimoji="0" lang="de-DE" altLang="de-DE" sz="1800" b="0" i="0" u="none" strike="noStrike" cap="none" normalizeH="0" baseline="0" dirty="0" smtClean="0">
                 <a:ln>
                   <a:noFill/>
                 </a:ln>
@@ -8819,7 +10338,7 @@
               <a:t>&gt;</a:t>
             </a:r>
             <a:br>
-              <a:rPr kumimoji="0" lang="de-DE" altLang="de-DE" sz="1400" b="0" i="0" u="none" strike="noStrike" cap="none" normalizeH="0" baseline="0" dirty="0" smtClean="0">
+              <a:rPr kumimoji="0" lang="de-DE" altLang="de-DE" sz="1800" b="0" i="0" u="none" strike="noStrike" cap="none" normalizeH="0" baseline="0" dirty="0" smtClean="0">
                 <a:ln>
                   <a:noFill/>
                 </a:ln>
@@ -8832,7 +10351,7 @@
               </a:rPr>
             </a:br>
             <a:r>
-              <a:rPr kumimoji="0" lang="de-DE" altLang="de-DE" sz="1400" b="0" i="0" u="none" strike="noStrike" cap="none" normalizeH="0" baseline="0" dirty="0" smtClean="0">
+              <a:rPr kumimoji="0" lang="de-DE" altLang="de-DE" sz="1800" b="0" i="0" u="none" strike="noStrike" cap="none" normalizeH="0" baseline="0" dirty="0" smtClean="0">
                 <a:ln>
                   <a:noFill/>
                 </a:ln>
@@ -8846,7 +10365,7 @@
               <a:t>&lt;/</a:t>
             </a:r>
             <a:r>
-              <a:rPr kumimoji="0" lang="de-DE" altLang="de-DE" sz="1400" b="1" i="0" u="none" strike="noStrike" cap="none" normalizeH="0" baseline="0" dirty="0" err="1" smtClean="0">
+              <a:rPr kumimoji="0" lang="de-DE" altLang="de-DE" sz="1800" b="1" i="0" u="none" strike="noStrike" cap="none" normalizeH="0" baseline="0" dirty="0" err="1" smtClean="0">
                 <a:ln>
                   <a:noFill/>
                 </a:ln>
@@ -8860,7 +10379,7 @@
               <a:t>AnchorPane</a:t>
             </a:r>
             <a:r>
-              <a:rPr kumimoji="0" lang="de-DE" altLang="de-DE" sz="1400" b="0" i="0" u="none" strike="noStrike" cap="none" normalizeH="0" baseline="0" dirty="0" smtClean="0">
+              <a:rPr kumimoji="0" lang="de-DE" altLang="de-DE" sz="1800" b="0" i="0" u="none" strike="noStrike" cap="none" normalizeH="0" baseline="0" dirty="0" smtClean="0">
                 <a:ln>
                   <a:noFill/>
                 </a:ln>
@@ -8873,7 +10392,7 @@
               </a:rPr>
               <a:t>&gt;</a:t>
             </a:r>
-            <a:endParaRPr kumimoji="0" lang="de-DE" altLang="de-DE" sz="1400" b="0" i="0" u="none" strike="noStrike" cap="none" normalizeH="0" baseline="0" dirty="0" smtClean="0">
+            <a:endParaRPr kumimoji="0" lang="de-DE" altLang="de-DE" sz="1800" b="0" i="0" u="none" strike="noStrike" cap="none" normalizeH="0" baseline="0" dirty="0" smtClean="0">
               <a:ln>
                 <a:noFill/>
               </a:ln>
@@ -8944,7 +10463,7 @@
                   <a:srgbClr val="000000"/>
                 </a:solidFill>
               </a:rPr>
-              <a:t>29.05.2016</a:t>
+              <a:t>14.06.2016</a:t>
             </a:fld>
             <a:endParaRPr lang="de-CH">
               <a:solidFill>
@@ -9101,15 +10620,7 @@
             </a:r>
             <a:r>
               <a:rPr lang="de-CH" dirty="0" smtClean="0"/>
-              <a:t> ohne </a:t>
-            </a:r>
-            <a:r>
-              <a:rPr lang="de-CH" dirty="0" err="1"/>
-              <a:t>k</a:t>
-            </a:r>
-            <a:r>
-              <a:rPr lang="de-CH" dirty="0" err="1" smtClean="0"/>
-              <a:t>ompilierung</a:t>
+              <a:t> ohne Kompilierung</a:t>
             </a:r>
             <a:endParaRPr lang="de-CH" dirty="0"/>
           </a:p>
@@ -9203,7 +10714,7 @@
                   <a:srgbClr val="000000"/>
                 </a:solidFill>
               </a:rPr>
-              <a:t>29.05.2016</a:t>
+              <a:t>14.06.2016</a:t>
             </a:fld>
             <a:endParaRPr lang="de-CH">
               <a:solidFill>
@@ -9352,11 +10863,15 @@
             </a:r>
             <a:r>
               <a:rPr lang="de-CH" dirty="0"/>
-              <a:t> ohne </a:t>
-            </a:r>
-            <a:r>
-              <a:rPr lang="de-CH" dirty="0" err="1"/>
-              <a:t>kompilierung</a:t>
+              <a:t> </a:t>
+            </a:r>
+            <a:r>
+              <a:rPr lang="de-CH"/>
+              <a:t>ohne </a:t>
+            </a:r>
+            <a:r>
+              <a:rPr lang="de-CH" smtClean="0"/>
+              <a:t>Kompilierung</a:t>
             </a:r>
             <a:endParaRPr lang="de-CH" dirty="0"/>
           </a:p>
@@ -9373,7 +10888,7 @@
         <p:spPr bwMode="auto">
           <a:xfrm>
             <a:off x="738188" y="3942645"/>
-            <a:ext cx="9361040" cy="2862322"/>
+            <a:ext cx="9212262" cy="2862322"/>
           </a:xfrm>
           <a:prstGeom prst="rect">
             <a:avLst/>
@@ -10041,7 +11556,7 @@
                   <a:srgbClr val="000000"/>
                 </a:solidFill>
               </a:rPr>
-              <a:t>29.05.2016</a:t>
+              <a:t>14.06.2016</a:t>
             </a:fld>
             <a:endParaRPr lang="de-CH">
               <a:solidFill>
@@ -10150,25 +11665,25 @@
             </a:pPr>
             <a:r>
               <a:rPr lang="de-CH" dirty="0" smtClean="0">
-                <a:hlinkClick r:id="rId2"/>
+                <a:hlinkClick r:id="rId3"/>
               </a:rPr>
               <a:t>Open </a:t>
             </a:r>
             <a:r>
               <a:rPr lang="de-CH" dirty="0" err="1" smtClean="0">
-                <a:hlinkClick r:id="rId2"/>
+                <a:hlinkClick r:id="rId3"/>
               </a:rPr>
               <a:t>source</a:t>
             </a:r>
             <a:r>
               <a:rPr lang="de-CH" dirty="0" smtClean="0">
-                <a:hlinkClick r:id="rId2"/>
+                <a:hlinkClick r:id="rId3"/>
               </a:rPr>
               <a:t> mini </a:t>
             </a:r>
             <a:r>
               <a:rPr lang="de-CH" dirty="0" err="1" smtClean="0">
-                <a:hlinkClick r:id="rId2"/>
+                <a:hlinkClick r:id="rId3"/>
               </a:rPr>
               <a:t>framework</a:t>
             </a:r>
@@ -10235,7 +11750,7 @@
           <p:nvPr/>
         </p:nvPicPr>
         <p:blipFill>
-          <a:blip r:embed="rId3"/>
+          <a:blip r:embed="rId4"/>
           <a:stretch>
             <a:fillRect/>
           </a:stretch>
@@ -10308,7 +11823,7 @@
                   <a:srgbClr val="000000"/>
                 </a:solidFill>
               </a:rPr>
-              <a:t>29.05.2016</a:t>
+              <a:t>14.06.2016</a:t>
             </a:fld>
             <a:endParaRPr lang="de-CH">
               <a:solidFill>
@@ -11002,7 +12517,7 @@
                   <a:srgbClr val="000000"/>
                 </a:solidFill>
               </a:rPr>
-              <a:t>29.05.2016</a:t>
+              <a:t>14.06.2016</a:t>
             </a:fld>
             <a:endParaRPr lang="de-CH">
               <a:solidFill>

</xml_diff>